<commit_message>
Included a new feature for CPT parameter comparison (to plot different CPT correlations of the specific parameter in the same plot)
</commit_message>
<xml_diff>
--- a/Instructions_manual_for_DL_template_copy.pptx
+++ b/Instructions_manual_for_DL_template_copy.pptx
@@ -11,7 +11,9 @@
     <p:sldId id="286" r:id="rId5"/>
     <p:sldId id="285" r:id="rId6"/>
     <p:sldId id="287" r:id="rId7"/>
-    <p:sldId id="288" r:id="rId8"/>
+    <p:sldId id="290" r:id="rId8"/>
+    <p:sldId id="291" r:id="rId9"/>
+    <p:sldId id="288" r:id="rId10"/>
   </p:sldIdLst>
   <p:sldSz cx="12192000" cy="6858000"/>
   <p:notesSz cx="6858000" cy="9144000"/>
@@ -121,7 +123,7 @@
 <file path=ppt/revisionInfo.xml><?xml version="1.0" encoding="utf-8"?>
 <p1510:revInfo xmlns:a="http://schemas.openxmlformats.org/drawingml/2006/main" xmlns:r="http://schemas.openxmlformats.org/officeDocument/2006/relationships" xmlns:p1510="http://schemas.microsoft.com/office/powerpoint/2015/10/main">
   <p1510:revLst>
-    <p1510:client id="{173FDA13-9602-444B-A801-49FABDC1E7C7}" v="4" dt="2025-11-22T09:07:09.445"/>
+    <p1510:client id="{173FDA13-9602-444B-A801-49FABDC1E7C7}" v="17" dt="2025-11-23T08:32:21.483"/>
   </p1510:revLst>
 </p1510:revInfo>
 </file>
@@ -130,8 +132,8 @@
 <pc:chgInfo xmlns:a="http://schemas.openxmlformats.org/drawingml/2006/main" xmlns:r="http://schemas.openxmlformats.org/officeDocument/2006/relationships" xmlns:ac="http://schemas.microsoft.com/office/drawing/2013/main/command" xmlns:pc="http://schemas.microsoft.com/office/powerpoint/2013/main/command">
   <pc:docChgLst>
     <pc:chgData name="Hansini Mallikarachchi" userId="9c21c7c1-2407-4ab9-a695-a637b9258275" providerId="ADAL" clId="{0184871B-D10D-42BC-9B82-8D1B4DCAE281}"/>
-    <pc:docChg chg="custSel addSld delSld modSld">
-      <pc:chgData name="Hansini Mallikarachchi" userId="9c21c7c1-2407-4ab9-a695-a637b9258275" providerId="ADAL" clId="{0184871B-D10D-42BC-9B82-8D1B4DCAE281}" dt="2025-11-22T09:11:43.760" v="135" actId="20577"/>
+    <pc:docChg chg="undo custSel addSld delSld modSld">
+      <pc:chgData name="Hansini Mallikarachchi" userId="9c21c7c1-2407-4ab9-a695-a637b9258275" providerId="ADAL" clId="{0184871B-D10D-42BC-9B82-8D1B4DCAE281}" dt="2025-11-23T08:34:01.450" v="693" actId="207"/>
       <pc:docMkLst>
         <pc:docMk/>
       </pc:docMkLst>
@@ -156,14 +158,14 @@
           <pc:sldMk cId="1680882043" sldId="257"/>
         </pc:sldMkLst>
       </pc:sldChg>
-      <pc:sldChg chg="addSp modSp add mod">
-        <pc:chgData name="Hansini Mallikarachchi" userId="9c21c7c1-2407-4ab9-a695-a637b9258275" providerId="ADAL" clId="{0184871B-D10D-42BC-9B82-8D1B4DCAE281}" dt="2025-11-22T09:06:08.743" v="66" actId="20577"/>
+      <pc:sldChg chg="addSp delSp modSp add mod">
+        <pc:chgData name="Hansini Mallikarachchi" userId="9c21c7c1-2407-4ab9-a695-a637b9258275" providerId="ADAL" clId="{0184871B-D10D-42BC-9B82-8D1B4DCAE281}" dt="2025-11-23T08:33:13.372" v="688" actId="207"/>
         <pc:sldMkLst>
           <pc:docMk/>
           <pc:sldMk cId="3954544789" sldId="257"/>
         </pc:sldMkLst>
         <pc:spChg chg="add mod">
-          <ac:chgData name="Hansini Mallikarachchi" userId="9c21c7c1-2407-4ab9-a695-a637b9258275" providerId="ADAL" clId="{0184871B-D10D-42BC-9B82-8D1B4DCAE281}" dt="2025-11-22T09:05:17.845" v="14" actId="14100"/>
+          <ac:chgData name="Hansini Mallikarachchi" userId="9c21c7c1-2407-4ab9-a695-a637b9258275" providerId="ADAL" clId="{0184871B-D10D-42BC-9B82-8D1B4DCAE281}" dt="2025-11-23T08:15:33.464" v="328" actId="14100"/>
           <ac:spMkLst>
             <pc:docMk/>
             <pc:sldMk cId="3954544789" sldId="257"/>
@@ -171,11 +173,27 @@
           </ac:spMkLst>
         </pc:spChg>
         <pc:spChg chg="add mod">
-          <ac:chgData name="Hansini Mallikarachchi" userId="9c21c7c1-2407-4ab9-a695-a637b9258275" providerId="ADAL" clId="{0184871B-D10D-42BC-9B82-8D1B4DCAE281}" dt="2025-11-22T09:06:08.743" v="66" actId="20577"/>
+          <ac:chgData name="Hansini Mallikarachchi" userId="9c21c7c1-2407-4ab9-a695-a637b9258275" providerId="ADAL" clId="{0184871B-D10D-42BC-9B82-8D1B4DCAE281}" dt="2025-11-23T08:15:31.017" v="327" actId="1076"/>
           <ac:spMkLst>
             <pc:docMk/>
             <pc:sldMk cId="3954544789" sldId="257"/>
             <ac:spMk id="4" creationId="{50D91D09-04E2-F918-CBB7-081870B698AA}"/>
+          </ac:spMkLst>
+        </pc:spChg>
+        <pc:spChg chg="add del mod">
+          <ac:chgData name="Hansini Mallikarachchi" userId="9c21c7c1-2407-4ab9-a695-a637b9258275" providerId="ADAL" clId="{0184871B-D10D-42BC-9B82-8D1B4DCAE281}" dt="2025-11-23T08:16:12.773" v="375"/>
+          <ac:spMkLst>
+            <pc:docMk/>
+            <pc:sldMk cId="3954544789" sldId="257"/>
+            <ac:spMk id="7" creationId="{9369DA5C-CAB4-5693-C203-C105F06549C3}"/>
+          </ac:spMkLst>
+        </pc:spChg>
+        <pc:spChg chg="add mod">
+          <ac:chgData name="Hansini Mallikarachchi" userId="9c21c7c1-2407-4ab9-a695-a637b9258275" providerId="ADAL" clId="{0184871B-D10D-42BC-9B82-8D1B4DCAE281}" dt="2025-11-23T08:33:13.372" v="688" actId="207"/>
+          <ac:spMkLst>
+            <pc:docMk/>
+            <pc:sldMk cId="3954544789" sldId="257"/>
+            <ac:spMk id="8" creationId="{F65F4F44-992C-C9B6-0B38-49198D878FEC}"/>
           </ac:spMkLst>
         </pc:spChg>
       </pc:sldChg>
@@ -364,12 +382,107 @@
           </ac:spMkLst>
         </pc:spChg>
       </pc:sldChg>
-      <pc:sldChg chg="delSp mod">
-        <pc:chgData name="Hansini Mallikarachchi" userId="9c21c7c1-2407-4ab9-a695-a637b9258275" providerId="ADAL" clId="{0184871B-D10D-42BC-9B82-8D1B4DCAE281}" dt="2025-11-22T09:10:53.680" v="100" actId="478"/>
+      <pc:sldChg chg="addSp delSp modSp mod">
+        <pc:chgData name="Hansini Mallikarachchi" userId="9c21c7c1-2407-4ab9-a695-a637b9258275" providerId="ADAL" clId="{0184871B-D10D-42BC-9B82-8D1B4DCAE281}" dt="2025-11-23T08:33:40.836" v="691" actId="207"/>
+        <pc:sldMkLst>
+          <pc:docMk/>
+          <pc:sldMk cId="541780720" sldId="285"/>
+        </pc:sldMkLst>
+        <pc:spChg chg="mod">
+          <ac:chgData name="Hansini Mallikarachchi" userId="9c21c7c1-2407-4ab9-a695-a637b9258275" providerId="ADAL" clId="{0184871B-D10D-42BC-9B82-8D1B4DCAE281}" dt="2025-11-23T08:19:02.398" v="389"/>
+          <ac:spMkLst>
+            <pc:docMk/>
+            <pc:sldMk cId="541780720" sldId="285"/>
+            <ac:spMk id="2" creationId="{4A3A6C1D-F417-939C-C433-767E750AF787}"/>
+          </ac:spMkLst>
+        </pc:spChg>
+        <pc:spChg chg="mod">
+          <ac:chgData name="Hansini Mallikarachchi" userId="9c21c7c1-2407-4ab9-a695-a637b9258275" providerId="ADAL" clId="{0184871B-D10D-42BC-9B82-8D1B4DCAE281}" dt="2025-11-23T08:12:27.807" v="197" actId="1076"/>
+          <ac:spMkLst>
+            <pc:docMk/>
+            <pc:sldMk cId="541780720" sldId="285"/>
+            <ac:spMk id="8" creationId="{C9EDEA63-6C51-2922-B161-02691E8CF13A}"/>
+          </ac:spMkLst>
+        </pc:spChg>
+        <pc:spChg chg="del mod">
+          <ac:chgData name="Hansini Mallikarachchi" userId="9c21c7c1-2407-4ab9-a695-a637b9258275" providerId="ADAL" clId="{0184871B-D10D-42BC-9B82-8D1B4DCAE281}" dt="2025-11-23T08:13:05.312" v="200" actId="478"/>
+          <ac:spMkLst>
+            <pc:docMk/>
+            <pc:sldMk cId="541780720" sldId="285"/>
+            <ac:spMk id="9" creationId="{A7A436F5-1FF9-CC4C-CD4B-C47D02158688}"/>
+          </ac:spMkLst>
+        </pc:spChg>
+        <pc:spChg chg="mod">
+          <ac:chgData name="Hansini Mallikarachchi" userId="9c21c7c1-2407-4ab9-a695-a637b9258275" providerId="ADAL" clId="{0184871B-D10D-42BC-9B82-8D1B4DCAE281}" dt="2025-11-23T08:33:40.836" v="691" actId="207"/>
+          <ac:spMkLst>
+            <pc:docMk/>
+            <pc:sldMk cId="541780720" sldId="285"/>
+            <ac:spMk id="11" creationId="{5699EACD-D508-9C32-5E88-3937AB821ABE}"/>
+          </ac:spMkLst>
+        </pc:spChg>
+        <pc:spChg chg="mod">
+          <ac:chgData name="Hansini Mallikarachchi" userId="9c21c7c1-2407-4ab9-a695-a637b9258275" providerId="ADAL" clId="{0184871B-D10D-42BC-9B82-8D1B4DCAE281}" dt="2025-11-23T08:13:08.464" v="201" actId="1076"/>
+          <ac:spMkLst>
+            <pc:docMk/>
+            <pc:sldMk cId="541780720" sldId="285"/>
+            <ac:spMk id="19" creationId="{B0FD375E-F91C-8ABC-E181-2F3404BE6025}"/>
+          </ac:spMkLst>
+        </pc:spChg>
+        <pc:spChg chg="del">
+          <ac:chgData name="Hansini Mallikarachchi" userId="9c21c7c1-2407-4ab9-a695-a637b9258275" providerId="ADAL" clId="{0184871B-D10D-42BC-9B82-8D1B4DCAE281}" dt="2025-11-23T08:11:14.591" v="189" actId="478"/>
+          <ac:spMkLst>
+            <pc:docMk/>
+            <pc:sldMk cId="541780720" sldId="285"/>
+            <ac:spMk id="21" creationId="{B99D43F5-BF64-5F50-E738-ADC42BAFCDB7}"/>
+          </ac:spMkLst>
+        </pc:spChg>
+        <pc:picChg chg="add mod ord">
+          <ac:chgData name="Hansini Mallikarachchi" userId="9c21c7c1-2407-4ab9-a695-a637b9258275" providerId="ADAL" clId="{0184871B-D10D-42BC-9B82-8D1B4DCAE281}" dt="2025-11-23T08:12:17.704" v="193" actId="1076"/>
+          <ac:picMkLst>
+            <pc:docMk/>
+            <pc:sldMk cId="541780720" sldId="285"/>
+            <ac:picMk id="4" creationId="{647ADC8D-4434-EEFB-A024-E26532A6E99C}"/>
+          </ac:picMkLst>
+        </pc:picChg>
+        <pc:picChg chg="del">
+          <ac:chgData name="Hansini Mallikarachchi" userId="9c21c7c1-2407-4ab9-a695-a637b9258275" providerId="ADAL" clId="{0184871B-D10D-42BC-9B82-8D1B4DCAE281}" dt="2025-11-23T08:12:03.500" v="190" actId="478"/>
+          <ac:picMkLst>
+            <pc:docMk/>
+            <pc:sldMk cId="541780720" sldId="285"/>
+            <ac:picMk id="13" creationId="{1D6FAC04-8AAB-B637-4F58-DDA66D681952}"/>
+          </ac:picMkLst>
+        </pc:picChg>
+        <pc:cxnChg chg="add mod">
+          <ac:chgData name="Hansini Mallikarachchi" userId="9c21c7c1-2407-4ab9-a695-a637b9258275" providerId="ADAL" clId="{0184871B-D10D-42BC-9B82-8D1B4DCAE281}" dt="2025-11-23T08:13:31.394" v="203" actId="208"/>
+          <ac:cxnSpMkLst>
+            <pc:docMk/>
+            <pc:sldMk cId="541780720" sldId="285"/>
+            <ac:cxnSpMk id="12" creationId="{AAC85666-D8CA-444D-5A07-7B8FF2012395}"/>
+          </ac:cxnSpMkLst>
+        </pc:cxnChg>
+        <pc:cxnChg chg="mod">
+          <ac:chgData name="Hansini Mallikarachchi" userId="9c21c7c1-2407-4ab9-a695-a637b9258275" providerId="ADAL" clId="{0184871B-D10D-42BC-9B82-8D1B4DCAE281}" dt="2025-11-23T08:12:24.865" v="196" actId="14100"/>
+          <ac:cxnSpMkLst>
+            <pc:docMk/>
+            <pc:sldMk cId="541780720" sldId="285"/>
+            <ac:cxnSpMk id="17" creationId="{6842F1A9-AA15-5EA7-B2C6-C9F048FA6E15}"/>
+          </ac:cxnSpMkLst>
+        </pc:cxnChg>
+      </pc:sldChg>
+      <pc:sldChg chg="addSp delSp modSp mod">
+        <pc:chgData name="Hansini Mallikarachchi" userId="9c21c7c1-2407-4ab9-a695-a637b9258275" providerId="ADAL" clId="{0184871B-D10D-42BC-9B82-8D1B4DCAE281}" dt="2025-11-23T08:33:33.552" v="690" actId="207"/>
         <pc:sldMkLst>
           <pc:docMk/>
           <pc:sldMk cId="291260976" sldId="286"/>
         </pc:sldMkLst>
+        <pc:spChg chg="mod">
+          <ac:chgData name="Hansini Mallikarachchi" userId="9c21c7c1-2407-4ab9-a695-a637b9258275" providerId="ADAL" clId="{0184871B-D10D-42BC-9B82-8D1B4DCAE281}" dt="2025-11-23T08:20:11.724" v="394" actId="1076"/>
+          <ac:spMkLst>
+            <pc:docMk/>
+            <pc:sldMk cId="291260976" sldId="286"/>
+            <ac:spMk id="2" creationId="{76C1940F-79ED-B497-B95F-606E8FBBBFA2}"/>
+          </ac:spMkLst>
+        </pc:spChg>
         <pc:spChg chg="del">
           <ac:chgData name="Hansini Mallikarachchi" userId="9c21c7c1-2407-4ab9-a695-a637b9258275" providerId="ADAL" clId="{0184871B-D10D-42BC-9B82-8D1B4DCAE281}" dt="2025-11-22T09:10:53.680" v="100" actId="478"/>
           <ac:spMkLst>
@@ -378,21 +491,209 @@
             <ac:spMk id="3" creationId="{38BC7971-51CE-699E-1ADB-A3BC8657ECD5}"/>
           </ac:spMkLst>
         </pc:spChg>
+        <pc:spChg chg="del">
+          <ac:chgData name="Hansini Mallikarachchi" userId="9c21c7c1-2407-4ab9-a695-a637b9258275" providerId="ADAL" clId="{0184871B-D10D-42BC-9B82-8D1B4DCAE281}" dt="2025-11-23T08:17:39.918" v="381" actId="478"/>
+          <ac:spMkLst>
+            <pc:docMk/>
+            <pc:sldMk cId="291260976" sldId="286"/>
+            <ac:spMk id="6" creationId="{3EB52068-5885-F1DA-9781-CCC202318260}"/>
+          </ac:spMkLst>
+        </pc:spChg>
+        <pc:spChg chg="mod">
+          <ac:chgData name="Hansini Mallikarachchi" userId="9c21c7c1-2407-4ab9-a695-a637b9258275" providerId="ADAL" clId="{0184871B-D10D-42BC-9B82-8D1B4DCAE281}" dt="2025-11-23T08:20:15.395" v="395" actId="14100"/>
+          <ac:spMkLst>
+            <pc:docMk/>
+            <pc:sldMk cId="291260976" sldId="286"/>
+            <ac:spMk id="9" creationId="{A0092A09-7D75-21AB-3FF5-FE54E0937CBE}"/>
+          </ac:spMkLst>
+        </pc:spChg>
+        <pc:spChg chg="mod">
+          <ac:chgData name="Hansini Mallikarachchi" userId="9c21c7c1-2407-4ab9-a695-a637b9258275" providerId="ADAL" clId="{0184871B-D10D-42BC-9B82-8D1B4DCAE281}" dt="2025-11-23T08:20:31.419" v="400" actId="1076"/>
+          <ac:spMkLst>
+            <pc:docMk/>
+            <pc:sldMk cId="291260976" sldId="286"/>
+            <ac:spMk id="10" creationId="{5FC15478-5B58-8FD1-F12E-1ABA4F3739E7}"/>
+          </ac:spMkLst>
+        </pc:spChg>
+        <pc:spChg chg="del">
+          <ac:chgData name="Hansini Mallikarachchi" userId="9c21c7c1-2407-4ab9-a695-a637b9258275" providerId="ADAL" clId="{0184871B-D10D-42BC-9B82-8D1B4DCAE281}" dt="2025-11-23T08:20:26.740" v="399" actId="478"/>
+          <ac:spMkLst>
+            <pc:docMk/>
+            <pc:sldMk cId="291260976" sldId="286"/>
+            <ac:spMk id="11" creationId="{C472603A-087E-1F81-5EE6-0442E8FCF419}"/>
+          </ac:spMkLst>
+        </pc:spChg>
+        <pc:spChg chg="add mod">
+          <ac:chgData name="Hansini Mallikarachchi" userId="9c21c7c1-2407-4ab9-a695-a637b9258275" providerId="ADAL" clId="{0184871B-D10D-42BC-9B82-8D1B4DCAE281}" dt="2025-11-23T08:33:33.552" v="690" actId="207"/>
+          <ac:spMkLst>
+            <pc:docMk/>
+            <pc:sldMk cId="291260976" sldId="286"/>
+            <ac:spMk id="16" creationId="{BB7B3B2B-6B81-C008-A8A4-E11F61DCF10D}"/>
+          </ac:spMkLst>
+        </pc:spChg>
+        <pc:picChg chg="add mod">
+          <ac:chgData name="Hansini Mallikarachchi" userId="9c21c7c1-2407-4ab9-a695-a637b9258275" providerId="ADAL" clId="{0184871B-D10D-42BC-9B82-8D1B4DCAE281}" dt="2025-11-23T08:17:43.506" v="383" actId="1076"/>
+          <ac:picMkLst>
+            <pc:docMk/>
+            <pc:sldMk cId="291260976" sldId="286"/>
+            <ac:picMk id="4" creationId="{45787035-9F4E-92DE-D35A-328E67273361}"/>
+          </ac:picMkLst>
+        </pc:picChg>
+        <pc:picChg chg="del mod">
+          <ac:chgData name="Hansini Mallikarachchi" userId="9c21c7c1-2407-4ab9-a695-a637b9258275" providerId="ADAL" clId="{0184871B-D10D-42BC-9B82-8D1B4DCAE281}" dt="2025-11-23T08:17:36.955" v="380" actId="478"/>
+          <ac:picMkLst>
+            <pc:docMk/>
+            <pc:sldMk cId="291260976" sldId="286"/>
+            <ac:picMk id="5" creationId="{BF332C27-F3D2-1A09-B0D7-474F70365318}"/>
+          </ac:picMkLst>
+        </pc:picChg>
+        <pc:picChg chg="mod">
+          <ac:chgData name="Hansini Mallikarachchi" userId="9c21c7c1-2407-4ab9-a695-a637b9258275" providerId="ADAL" clId="{0184871B-D10D-42BC-9B82-8D1B4DCAE281}" dt="2025-11-23T08:20:34.746" v="401" actId="1076"/>
+          <ac:picMkLst>
+            <pc:docMk/>
+            <pc:sldMk cId="291260976" sldId="286"/>
+            <ac:picMk id="8" creationId="{C3478036-427B-1AD8-104B-7988FBFE08C0}"/>
+          </ac:picMkLst>
+        </pc:picChg>
+        <pc:picChg chg="add mod">
+          <ac:chgData name="Hansini Mallikarachchi" userId="9c21c7c1-2407-4ab9-a695-a637b9258275" providerId="ADAL" clId="{0184871B-D10D-42BC-9B82-8D1B4DCAE281}" dt="2025-11-23T08:18:13.906" v="385" actId="1076"/>
+          <ac:picMkLst>
+            <pc:docMk/>
+            <pc:sldMk cId="291260976" sldId="286"/>
+            <ac:picMk id="12" creationId="{7B3997FA-F9C2-588C-1597-9F47B3CEEF43}"/>
+          </ac:picMkLst>
+        </pc:picChg>
+        <pc:picChg chg="add mod">
+          <ac:chgData name="Hansini Mallikarachchi" userId="9c21c7c1-2407-4ab9-a695-a637b9258275" providerId="ADAL" clId="{0184871B-D10D-42BC-9B82-8D1B4DCAE281}" dt="2025-11-23T08:22:14.747" v="460" actId="14100"/>
+          <ac:picMkLst>
+            <pc:docMk/>
+            <pc:sldMk cId="291260976" sldId="286"/>
+            <ac:picMk id="18" creationId="{CC871A03-4789-64EA-2A5D-DEB458AA0F94}"/>
+          </ac:picMkLst>
+        </pc:picChg>
+        <pc:cxnChg chg="add mod">
+          <ac:chgData name="Hansini Mallikarachchi" userId="9c21c7c1-2407-4ab9-a695-a637b9258275" providerId="ADAL" clId="{0184871B-D10D-42BC-9B82-8D1B4DCAE281}" dt="2025-11-23T08:21:05.259" v="404" actId="14100"/>
+          <ac:cxnSpMkLst>
+            <pc:docMk/>
+            <pc:sldMk cId="291260976" sldId="286"/>
+            <ac:cxnSpMk id="14" creationId="{B177D26C-82F0-7A77-B29B-BAF7BEFAA41B}"/>
+          </ac:cxnSpMkLst>
+        </pc:cxnChg>
       </pc:sldChg>
       <pc:sldChg chg="modSp mod">
-        <pc:chgData name="Hansini Mallikarachchi" userId="9c21c7c1-2407-4ab9-a695-a637b9258275" providerId="ADAL" clId="{0184871B-D10D-42BC-9B82-8D1B4DCAE281}" dt="2025-11-22T09:11:43.760" v="135" actId="20577"/>
+        <pc:chgData name="Hansini Mallikarachchi" userId="9c21c7c1-2407-4ab9-a695-a637b9258275" providerId="ADAL" clId="{0184871B-D10D-42BC-9B82-8D1B4DCAE281}" dt="2025-11-23T08:24:27.506" v="503"/>
+        <pc:sldMkLst>
+          <pc:docMk/>
+          <pc:sldMk cId="3391759910" sldId="287"/>
+        </pc:sldMkLst>
+        <pc:spChg chg="mod">
+          <ac:chgData name="Hansini Mallikarachchi" userId="9c21c7c1-2407-4ab9-a695-a637b9258275" providerId="ADAL" clId="{0184871B-D10D-42BC-9B82-8D1B4DCAE281}" dt="2025-11-23T08:19:11.264" v="393"/>
+          <ac:spMkLst>
+            <pc:docMk/>
+            <pc:sldMk cId="3391759910" sldId="287"/>
+            <ac:spMk id="4" creationId="{41ABE075-5584-A700-93AC-08D0A77B8E70}"/>
+          </ac:spMkLst>
+        </pc:spChg>
+        <pc:spChg chg="mod">
+          <ac:chgData name="Hansini Mallikarachchi" userId="9c21c7c1-2407-4ab9-a695-a637b9258275" providerId="ADAL" clId="{0184871B-D10D-42BC-9B82-8D1B4DCAE281}" dt="2025-11-23T08:24:27.506" v="503"/>
+          <ac:spMkLst>
+            <pc:docMk/>
+            <pc:sldMk cId="3391759910" sldId="287"/>
+            <ac:spMk id="13" creationId="{DF54BBE3-A3AC-D6DD-1E11-89BA10BDCC41}"/>
+          </ac:spMkLst>
+        </pc:spChg>
+      </pc:sldChg>
+      <pc:sldChg chg="modSp add mod">
+        <pc:chgData name="Hansini Mallikarachchi" userId="9c21c7c1-2407-4ab9-a695-a637b9258275" providerId="ADAL" clId="{0184871B-D10D-42BC-9B82-8D1B4DCAE281}" dt="2025-11-23T08:31:20.227" v="661" actId="20577"/>
+        <pc:sldMkLst>
+          <pc:docMk/>
+          <pc:sldMk cId="337356283" sldId="288"/>
+        </pc:sldMkLst>
+        <pc:spChg chg="mod">
+          <ac:chgData name="Hansini Mallikarachchi" userId="9c21c7c1-2407-4ab9-a695-a637b9258275" providerId="ADAL" clId="{0184871B-D10D-42BC-9B82-8D1B4DCAE281}" dt="2025-11-23T08:31:20.227" v="661" actId="20577"/>
+          <ac:spMkLst>
+            <pc:docMk/>
+            <pc:sldMk cId="337356283" sldId="288"/>
+            <ac:spMk id="8" creationId="{921367AE-6E1E-4086-625C-FB0CD3319BA8}"/>
+          </ac:spMkLst>
+        </pc:spChg>
+      </pc:sldChg>
+      <pc:sldChg chg="del">
+        <pc:chgData name="Hansini Mallikarachchi" userId="9c21c7c1-2407-4ab9-a695-a637b9258275" providerId="ADAL" clId="{0184871B-D10D-42BC-9B82-8D1B4DCAE281}" dt="2025-11-23T08:31:07.435" v="645" actId="2696"/>
+        <pc:sldMkLst>
+          <pc:docMk/>
+          <pc:sldMk cId="1538239963" sldId="288"/>
+        </pc:sldMkLst>
+      </pc:sldChg>
+      <pc:sldChg chg="modSp mod">
+        <pc:chgData name="Hansini Mallikarachchi" userId="9c21c7c1-2407-4ab9-a695-a637b9258275" providerId="ADAL" clId="{0184871B-D10D-42BC-9B82-8D1B4DCAE281}" dt="2025-11-23T08:33:19.722" v="689" actId="207"/>
         <pc:sldMkLst>
           <pc:docMk/>
           <pc:sldMk cId="3973068812" sldId="289"/>
         </pc:sldMkLst>
         <pc:spChg chg="mod">
-          <ac:chgData name="Hansini Mallikarachchi" userId="9c21c7c1-2407-4ab9-a695-a637b9258275" providerId="ADAL" clId="{0184871B-D10D-42BC-9B82-8D1B4DCAE281}" dt="2025-11-22T09:11:43.760" v="135" actId="20577"/>
+          <ac:chgData name="Hansini Mallikarachchi" userId="9c21c7c1-2407-4ab9-a695-a637b9258275" providerId="ADAL" clId="{0184871B-D10D-42BC-9B82-8D1B4DCAE281}" dt="2025-11-23T08:33:19.722" v="689" actId="207"/>
           <ac:spMkLst>
             <pc:docMk/>
             <pc:sldMk cId="3973068812" sldId="289"/>
             <ac:spMk id="3" creationId="{0D1CE52A-24E2-75E0-BE6B-E66BF3BA8396}"/>
           </ac:spMkLst>
         </pc:spChg>
+      </pc:sldChg>
+      <pc:sldChg chg="addSp delSp modSp new mod">
+        <pc:chgData name="Hansini Mallikarachchi" userId="9c21c7c1-2407-4ab9-a695-a637b9258275" providerId="ADAL" clId="{0184871B-D10D-42BC-9B82-8D1B4DCAE281}" dt="2025-11-23T08:33:55.529" v="692" actId="207"/>
+        <pc:sldMkLst>
+          <pc:docMk/>
+          <pc:sldMk cId="3758796533" sldId="290"/>
+        </pc:sldMkLst>
+        <pc:spChg chg="mod">
+          <ac:chgData name="Hansini Mallikarachchi" userId="9c21c7c1-2407-4ab9-a695-a637b9258275" providerId="ADAL" clId="{0184871B-D10D-42BC-9B82-8D1B4DCAE281}" dt="2025-11-23T08:33:55.529" v="692" actId="207"/>
+          <ac:spMkLst>
+            <pc:docMk/>
+            <pc:sldMk cId="3758796533" sldId="290"/>
+            <ac:spMk id="2" creationId="{F977AD8F-9A82-C846-78C7-49368ACDBAEC}"/>
+          </ac:spMkLst>
+        </pc:spChg>
+        <pc:spChg chg="mod">
+          <ac:chgData name="Hansini Mallikarachchi" userId="9c21c7c1-2407-4ab9-a695-a637b9258275" providerId="ADAL" clId="{0184871B-D10D-42BC-9B82-8D1B4DCAE281}" dt="2025-11-23T08:29:35.314" v="588" actId="20577"/>
+          <ac:spMkLst>
+            <pc:docMk/>
+            <pc:sldMk cId="3758796533" sldId="290"/>
+            <ac:spMk id="3" creationId="{0B3B8652-3256-5DB8-1D5C-771273386D2C}"/>
+          </ac:spMkLst>
+        </pc:spChg>
+        <pc:spChg chg="add">
+          <ac:chgData name="Hansini Mallikarachchi" userId="9c21c7c1-2407-4ab9-a695-a637b9258275" providerId="ADAL" clId="{0184871B-D10D-42BC-9B82-8D1B4DCAE281}" dt="2025-11-23T08:28:33.739" v="582" actId="11529"/>
+          <ac:spMkLst>
+            <pc:docMk/>
+            <pc:sldMk cId="3758796533" sldId="290"/>
+            <ac:spMk id="9" creationId="{63ACA11D-4E26-D7AE-7655-9659F70A8BEB}"/>
+          </ac:spMkLst>
+        </pc:spChg>
+        <pc:picChg chg="add mod">
+          <ac:chgData name="Hansini Mallikarachchi" userId="9c21c7c1-2407-4ab9-a695-a637b9258275" providerId="ADAL" clId="{0184871B-D10D-42BC-9B82-8D1B4DCAE281}" dt="2025-11-23T08:27:11.310" v="540" actId="1076"/>
+          <ac:picMkLst>
+            <pc:docMk/>
+            <pc:sldMk cId="3758796533" sldId="290"/>
+            <ac:picMk id="5" creationId="{FC4D6981-16C9-EF8A-0E9A-FE74B1846197}"/>
+          </ac:picMkLst>
+        </pc:picChg>
+        <pc:picChg chg="add del mod">
+          <ac:chgData name="Hansini Mallikarachchi" userId="9c21c7c1-2407-4ab9-a695-a637b9258275" providerId="ADAL" clId="{0184871B-D10D-42BC-9B82-8D1B4DCAE281}" dt="2025-11-23T08:28:03.564" v="579" actId="478"/>
+          <ac:picMkLst>
+            <pc:docMk/>
+            <pc:sldMk cId="3758796533" sldId="290"/>
+            <ac:picMk id="6" creationId="{A275FE6C-E46C-2C20-564C-EB959E160021}"/>
+          </ac:picMkLst>
+        </pc:picChg>
+        <pc:picChg chg="add mod">
+          <ac:chgData name="Hansini Mallikarachchi" userId="9c21c7c1-2407-4ab9-a695-a637b9258275" providerId="ADAL" clId="{0184871B-D10D-42BC-9B82-8D1B4DCAE281}" dt="2025-11-23T08:29:40.914" v="589" actId="1076"/>
+          <ac:picMkLst>
+            <pc:docMk/>
+            <pc:sldMk cId="3758796533" sldId="290"/>
+            <ac:picMk id="8" creationId="{D9FD07E0-D248-8C35-6E6A-08F98EF4B87E}"/>
+          </ac:picMkLst>
+        </pc:picChg>
       </pc:sldChg>
       <pc:sldChg chg="del">
         <pc:chgData name="Hansini Mallikarachchi" userId="9c21c7c1-2407-4ab9-a695-a637b9258275" providerId="ADAL" clId="{0184871B-D10D-42BC-9B82-8D1B4DCAE281}" dt="2025-11-22T09:02:33.787" v="0" actId="47"/>
@@ -407,6 +708,77 @@
           <pc:docMk/>
           <pc:sldMk cId="177676322" sldId="291"/>
         </pc:sldMkLst>
+      </pc:sldChg>
+      <pc:sldChg chg="addSp delSp modSp new mod">
+        <pc:chgData name="Hansini Mallikarachchi" userId="9c21c7c1-2407-4ab9-a695-a637b9258275" providerId="ADAL" clId="{0184871B-D10D-42BC-9B82-8D1B4DCAE281}" dt="2025-11-23T08:34:01.450" v="693" actId="207"/>
+        <pc:sldMkLst>
+          <pc:docMk/>
+          <pc:sldMk cId="1595311118" sldId="291"/>
+        </pc:sldMkLst>
+        <pc:spChg chg="del">
+          <ac:chgData name="Hansini Mallikarachchi" userId="9c21c7c1-2407-4ab9-a695-a637b9258275" providerId="ADAL" clId="{0184871B-D10D-42BC-9B82-8D1B4DCAE281}" dt="2025-11-23T08:28:53.293" v="585"/>
+          <ac:spMkLst>
+            <pc:docMk/>
+            <pc:sldMk cId="1595311118" sldId="291"/>
+            <ac:spMk id="2" creationId="{2C2A11F5-06CE-95A8-DF2C-B97FD1D3A314}"/>
+          </ac:spMkLst>
+        </pc:spChg>
+        <pc:spChg chg="del">
+          <ac:chgData name="Hansini Mallikarachchi" userId="9c21c7c1-2407-4ab9-a695-a637b9258275" providerId="ADAL" clId="{0184871B-D10D-42BC-9B82-8D1B4DCAE281}" dt="2025-11-23T08:23:22.954" v="462" actId="22"/>
+          <ac:spMkLst>
+            <pc:docMk/>
+            <pc:sldMk cId="1595311118" sldId="291"/>
+            <ac:spMk id="3" creationId="{5B2CF55F-F4A2-ECE2-F43A-17E7CB979314}"/>
+          </ac:spMkLst>
+        </pc:spChg>
+        <pc:spChg chg="add del">
+          <ac:chgData name="Hansini Mallikarachchi" userId="9c21c7c1-2407-4ab9-a695-a637b9258275" providerId="ADAL" clId="{0184871B-D10D-42BC-9B82-8D1B4DCAE281}" dt="2025-11-23T08:24:46.042" v="505" actId="478"/>
+          <ac:spMkLst>
+            <pc:docMk/>
+            <pc:sldMk cId="1595311118" sldId="291"/>
+            <ac:spMk id="7" creationId="{7C771C04-C7BA-AC88-5F49-EAF93285D55E}"/>
+          </ac:spMkLst>
+        </pc:spChg>
+        <pc:spChg chg="add mod">
+          <ac:chgData name="Hansini Mallikarachchi" userId="9c21c7c1-2407-4ab9-a695-a637b9258275" providerId="ADAL" clId="{0184871B-D10D-42BC-9B82-8D1B4DCAE281}" dt="2025-11-23T08:30:00.073" v="593" actId="1076"/>
+          <ac:spMkLst>
+            <pc:docMk/>
+            <pc:sldMk cId="1595311118" sldId="291"/>
+            <ac:spMk id="8" creationId="{3994FF61-BF87-0A28-F48D-7E37B9B4854E}"/>
+          </ac:spMkLst>
+        </pc:spChg>
+        <pc:spChg chg="add mod">
+          <ac:chgData name="Hansini Mallikarachchi" userId="9c21c7c1-2407-4ab9-a695-a637b9258275" providerId="ADAL" clId="{0184871B-D10D-42BC-9B82-8D1B4DCAE281}" dt="2025-11-23T08:31:28.884" v="662" actId="1076"/>
+          <ac:spMkLst>
+            <pc:docMk/>
+            <pc:sldMk cId="1595311118" sldId="291"/>
+            <ac:spMk id="10" creationId="{B6772EA4-394C-F315-7C80-520E848321C0}"/>
+          </ac:spMkLst>
+        </pc:spChg>
+        <pc:spChg chg="add mod">
+          <ac:chgData name="Hansini Mallikarachchi" userId="9c21c7c1-2407-4ab9-a695-a637b9258275" providerId="ADAL" clId="{0184871B-D10D-42BC-9B82-8D1B4DCAE281}" dt="2025-11-23T08:34:01.450" v="693" actId="207"/>
+          <ac:spMkLst>
+            <pc:docMk/>
+            <pc:sldMk cId="1595311118" sldId="291"/>
+            <ac:spMk id="11" creationId="{3E3DEAC2-DBEC-5DD4-59AE-E6F84E7DFDC1}"/>
+          </ac:spMkLst>
+        </pc:spChg>
+        <pc:spChg chg="add mod">
+          <ac:chgData name="Hansini Mallikarachchi" userId="9c21c7c1-2407-4ab9-a695-a637b9258275" providerId="ADAL" clId="{0184871B-D10D-42BC-9B82-8D1B4DCAE281}" dt="2025-11-23T08:30:35.040" v="613" actId="20577"/>
+          <ac:spMkLst>
+            <pc:docMk/>
+            <pc:sldMk cId="1595311118" sldId="291"/>
+            <ac:spMk id="12" creationId="{B17CF586-3EF8-42AA-C06B-BBECC6C782F8}"/>
+          </ac:spMkLst>
+        </pc:spChg>
+        <pc:picChg chg="add mod ord">
+          <ac:chgData name="Hansini Mallikarachchi" userId="9c21c7c1-2407-4ab9-a695-a637b9258275" providerId="ADAL" clId="{0184871B-D10D-42BC-9B82-8D1B4DCAE281}" dt="2025-11-23T08:30:03.442" v="595" actId="1076"/>
+          <ac:picMkLst>
+            <pc:docMk/>
+            <pc:sldMk cId="1595311118" sldId="291"/>
+            <ac:picMk id="5" creationId="{601BF7FA-54C2-C39B-DF5E-12E58AB85EA8}"/>
+          </ac:picMkLst>
+        </pc:picChg>
       </pc:sldChg>
     </pc:docChg>
   </pc:docChgLst>
@@ -560,7 +932,7 @@
           <a:p>
             <a:fld id="{66109ECC-F8E8-42EF-B852-4CDB9C3622B2}" type="datetimeFigureOut">
               <a:rPr lang="en-GB" smtClean="0"/>
-              <a:t>22/11/2025</a:t>
+              <a:t>23/11/2025</a:t>
             </a:fld>
             <a:endParaRPr lang="en-GB"/>
           </a:p>
@@ -758,7 +1130,7 @@
           <a:p>
             <a:fld id="{66109ECC-F8E8-42EF-B852-4CDB9C3622B2}" type="datetimeFigureOut">
               <a:rPr lang="en-GB" smtClean="0"/>
-              <a:t>22/11/2025</a:t>
+              <a:t>23/11/2025</a:t>
             </a:fld>
             <a:endParaRPr lang="en-GB"/>
           </a:p>
@@ -966,7 +1338,7 @@
           <a:p>
             <a:fld id="{66109ECC-F8E8-42EF-B852-4CDB9C3622B2}" type="datetimeFigureOut">
               <a:rPr lang="en-GB" smtClean="0"/>
-              <a:t>22/11/2025</a:t>
+              <a:t>23/11/2025</a:t>
             </a:fld>
             <a:endParaRPr lang="en-GB"/>
           </a:p>
@@ -1164,7 +1536,7 @@
           <a:p>
             <a:fld id="{66109ECC-F8E8-42EF-B852-4CDB9C3622B2}" type="datetimeFigureOut">
               <a:rPr lang="en-GB" smtClean="0"/>
-              <a:t>22/11/2025</a:t>
+              <a:t>23/11/2025</a:t>
             </a:fld>
             <a:endParaRPr lang="en-GB"/>
           </a:p>
@@ -1439,7 +1811,7 @@
           <a:p>
             <a:fld id="{66109ECC-F8E8-42EF-B852-4CDB9C3622B2}" type="datetimeFigureOut">
               <a:rPr lang="en-GB" smtClean="0"/>
-              <a:t>22/11/2025</a:t>
+              <a:t>23/11/2025</a:t>
             </a:fld>
             <a:endParaRPr lang="en-GB"/>
           </a:p>
@@ -1704,7 +2076,7 @@
           <a:p>
             <a:fld id="{66109ECC-F8E8-42EF-B852-4CDB9C3622B2}" type="datetimeFigureOut">
               <a:rPr lang="en-GB" smtClean="0"/>
-              <a:t>22/11/2025</a:t>
+              <a:t>23/11/2025</a:t>
             </a:fld>
             <a:endParaRPr lang="en-GB"/>
           </a:p>
@@ -2116,7 +2488,7 @@
           <a:p>
             <a:fld id="{66109ECC-F8E8-42EF-B852-4CDB9C3622B2}" type="datetimeFigureOut">
               <a:rPr lang="en-GB" smtClean="0"/>
-              <a:t>22/11/2025</a:t>
+              <a:t>23/11/2025</a:t>
             </a:fld>
             <a:endParaRPr lang="en-GB"/>
           </a:p>
@@ -2257,7 +2629,7 @@
           <a:p>
             <a:fld id="{66109ECC-F8E8-42EF-B852-4CDB9C3622B2}" type="datetimeFigureOut">
               <a:rPr lang="en-GB" smtClean="0"/>
-              <a:t>22/11/2025</a:t>
+              <a:t>23/11/2025</a:t>
             </a:fld>
             <a:endParaRPr lang="en-GB"/>
           </a:p>
@@ -2370,7 +2742,7 @@
           <a:p>
             <a:fld id="{66109ECC-F8E8-42EF-B852-4CDB9C3622B2}" type="datetimeFigureOut">
               <a:rPr lang="en-GB" smtClean="0"/>
-              <a:t>22/11/2025</a:t>
+              <a:t>23/11/2025</a:t>
             </a:fld>
             <a:endParaRPr lang="en-GB"/>
           </a:p>
@@ -2681,7 +3053,7 @@
           <a:p>
             <a:fld id="{66109ECC-F8E8-42EF-B852-4CDB9C3622B2}" type="datetimeFigureOut">
               <a:rPr lang="en-GB" smtClean="0"/>
-              <a:t>22/11/2025</a:t>
+              <a:t>23/11/2025</a:t>
             </a:fld>
             <a:endParaRPr lang="en-GB"/>
           </a:p>
@@ -2969,7 +3341,7 @@
           <a:p>
             <a:fld id="{66109ECC-F8E8-42EF-B852-4CDB9C3622B2}" type="datetimeFigureOut">
               <a:rPr lang="en-GB" smtClean="0"/>
-              <a:t>22/11/2025</a:t>
+              <a:t>23/11/2025</a:t>
             </a:fld>
             <a:endParaRPr lang="en-GB"/>
           </a:p>
@@ -3210,7 +3582,7 @@
           <a:p>
             <a:fld id="{66109ECC-F8E8-42EF-B852-4CDB9C3622B2}" type="datetimeFigureOut">
               <a:rPr lang="en-GB" smtClean="0"/>
-              <a:t>22/11/2025</a:t>
+              <a:t>23/11/2025</a:t>
             </a:fld>
             <a:endParaRPr lang="en-GB"/>
           </a:p>
@@ -3869,9 +4241,46 @@
               <a:t>lab_data_per_units</a:t>
             </a:r>
             <a:r>
-              <a:rPr lang="en-GB"/>
+              <a:rPr lang="en-GB" dirty="0"/>
               <a:t> folder)</a:t>
             </a:r>
+          </a:p>
+          <a:p>
+            <a:r>
+              <a:rPr lang="en-GB" dirty="0">
+                <a:solidFill>
+                  <a:schemeClr val="accent5">
+                    <a:lumMod val="60000"/>
+                    <a:lumOff val="40000"/>
+                  </a:schemeClr>
+                </a:solidFill>
+              </a:rPr>
+              <a:t>Parameter comparison.xlsx – lab data per units (Inside </a:t>
+            </a:r>
+            <a:r>
+              <a:rPr lang="en-GB" dirty="0" err="1">
+                <a:solidFill>
+                  <a:schemeClr val="accent5">
+                    <a:lumMod val="60000"/>
+                    <a:lumOff val="40000"/>
+                  </a:schemeClr>
+                </a:solidFill>
+              </a:rPr>
+              <a:t>parameter_comparison</a:t>
+            </a:r>
+            <a:r>
+              <a:rPr lang="en-GB" dirty="0">
+                <a:solidFill>
+                  <a:schemeClr val="accent5">
+                    <a:lumMod val="60000"/>
+                    <a:lumOff val="40000"/>
+                  </a:schemeClr>
+                </a:solidFill>
+              </a:rPr>
+              <a:t> folder)</a:t>
+            </a:r>
+          </a:p>
+          <a:p>
             <a:endParaRPr lang="en-GB" dirty="0"/>
           </a:p>
         </p:txBody>
@@ -4025,7 +4434,7 @@
         <p:spPr>
           <a:xfrm>
             <a:off x="7315201" y="4350936"/>
-            <a:ext cx="1956538" cy="1427998"/>
+            <a:ext cx="1956538" cy="1892578"/>
           </a:xfrm>
           <a:prstGeom prst="rect">
             <a:avLst/>
@@ -4076,7 +4485,7 @@
         </p:nvSpPr>
         <p:spPr>
           <a:xfrm>
-            <a:off x="6983604" y="6089301"/>
+            <a:off x="7058739" y="6243514"/>
             <a:ext cx="3195376" cy="646331"/>
           </a:xfrm>
           <a:prstGeom prst="rect">
@@ -4099,6 +4508,46 @@
               <a:t>DL_template_copy</a:t>
             </a:r>
             <a:endParaRPr lang="en-GB" dirty="0"/>
+          </a:p>
+        </p:txBody>
+      </p:sp>
+      <p:sp>
+        <p:nvSpPr>
+          <p:cNvPr id="8" name="TextBox 7">
+            <a:extLst>
+              <a:ext uri="{FF2B5EF4-FFF2-40B4-BE49-F238E27FC236}">
+                <a16:creationId xmlns:a16="http://schemas.microsoft.com/office/drawing/2014/main" id="{F65F4F44-992C-C9B6-0B38-49198D878FEC}"/>
+              </a:ext>
+            </a:extLst>
+          </p:cNvPr>
+          <p:cNvSpPr txBox="1"/>
+          <p:nvPr/>
+        </p:nvSpPr>
+        <p:spPr>
+          <a:xfrm>
+            <a:off x="7506119" y="5501554"/>
+            <a:ext cx="1678074" cy="646331"/>
+          </a:xfrm>
+          <a:prstGeom prst="rect">
+            <a:avLst/>
+          </a:prstGeom>
+          <a:solidFill>
+            <a:schemeClr val="accent5">
+              <a:lumMod val="40000"/>
+              <a:lumOff val="60000"/>
+            </a:schemeClr>
+          </a:solidFill>
+        </p:spPr>
+        <p:txBody>
+          <a:bodyPr wrap="square" rtlCol="0">
+            <a:spAutoFit/>
+          </a:bodyPr>
+          <a:lstStyle/>
+          <a:p>
+            <a:r>
+              <a:rPr lang="en-GB" sz="1200" dirty="0"/>
+              <a:t>CPT Parameter comparison per location</a:t>
+            </a:r>
           </a:p>
         </p:txBody>
       </p:sp>
@@ -4132,12 +4581,118 @@
           <a:chExt cx="0" cy="0"/>
         </a:xfrm>
       </p:grpSpPr>
+      <p:sp>
+        <p:nvSpPr>
+          <p:cNvPr id="2" name="Title 1">
+            <a:extLst>
+              <a:ext uri="{FF2B5EF4-FFF2-40B4-BE49-F238E27FC236}">
+                <a16:creationId xmlns:a16="http://schemas.microsoft.com/office/drawing/2014/main" id="{76C1940F-79ED-B497-B95F-606E8FBBBFA2}"/>
+              </a:ext>
+            </a:extLst>
+          </p:cNvPr>
+          <p:cNvSpPr>
+            <a:spLocks noGrp="1"/>
+          </p:cNvSpPr>
+          <p:nvPr>
+            <p:ph type="title"/>
+          </p:nvPr>
+        </p:nvSpPr>
+        <p:spPr>
+          <a:xfrm>
+            <a:off x="372856" y="221356"/>
+            <a:ext cx="10515600" cy="1325563"/>
+          </a:xfrm>
+        </p:spPr>
+        <p:txBody>
+          <a:bodyPr/>
+          <a:lstStyle/>
+          <a:p>
+            <a:r>
+              <a:rPr lang="en-GB" dirty="0"/>
+              <a:t>Inputs from GIR tool</a:t>
+            </a:r>
+          </a:p>
+        </p:txBody>
+      </p:sp>
+      <p:sp>
+        <p:nvSpPr>
+          <p:cNvPr id="9" name="Text Placeholder 8">
+            <a:extLst>
+              <a:ext uri="{FF2B5EF4-FFF2-40B4-BE49-F238E27FC236}">
+                <a16:creationId xmlns:a16="http://schemas.microsoft.com/office/drawing/2014/main" id="{A0092A09-7D75-21AB-3FF5-FE54E0937CBE}"/>
+              </a:ext>
+            </a:extLst>
+          </p:cNvPr>
+          <p:cNvSpPr>
+            <a:spLocks noGrp="1"/>
+          </p:cNvSpPr>
+          <p:nvPr>
+            <p:ph type="body" idx="1"/>
+          </p:nvPr>
+        </p:nvSpPr>
+        <p:spPr>
+          <a:xfrm>
+            <a:off x="372856" y="1591166"/>
+            <a:ext cx="3562351" cy="823912"/>
+          </a:xfrm>
+        </p:spPr>
+        <p:txBody>
+          <a:bodyPr>
+            <a:normAutofit/>
+          </a:bodyPr>
+          <a:lstStyle/>
+          <a:p>
+            <a:r>
+              <a:rPr lang="en-GB" dirty="0"/>
+              <a:t>Master CPT output file containing all locations</a:t>
+            </a:r>
+          </a:p>
+        </p:txBody>
+      </p:sp>
+      <p:sp>
+        <p:nvSpPr>
+          <p:cNvPr id="10" name="Text Placeholder 9">
+            <a:extLst>
+              <a:ext uri="{FF2B5EF4-FFF2-40B4-BE49-F238E27FC236}">
+                <a16:creationId xmlns:a16="http://schemas.microsoft.com/office/drawing/2014/main" id="{5FC15478-5B58-8FD1-F12E-1ABA4F3739E7}"/>
+              </a:ext>
+            </a:extLst>
+          </p:cNvPr>
+          <p:cNvSpPr>
+            <a:spLocks noGrp="1"/>
+          </p:cNvSpPr>
+          <p:nvPr>
+            <p:ph type="body" sz="quarter" idx="3"/>
+          </p:nvPr>
+        </p:nvSpPr>
+        <p:spPr>
+          <a:xfrm>
+            <a:off x="4363244" y="1768292"/>
+            <a:ext cx="2971801" cy="823912"/>
+          </a:xfrm>
+        </p:spPr>
+        <p:txBody>
+          <a:bodyPr>
+            <a:normAutofit/>
+          </a:bodyPr>
+          <a:lstStyle/>
+          <a:p>
+            <a:r>
+              <a:rPr lang="en-GB" dirty="0"/>
+              <a:t>Lab data per units (saved in a folder)</a:t>
+            </a:r>
+          </a:p>
+          <a:p>
+            <a:endParaRPr lang="en-GB" dirty="0"/>
+          </a:p>
+        </p:txBody>
+      </p:sp>
       <p:pic>
         <p:nvPicPr>
-          <p:cNvPr id="5" name="Picture 4">
-            <a:extLst>
-              <a:ext uri="{FF2B5EF4-FFF2-40B4-BE49-F238E27FC236}">
-                <a16:creationId xmlns:a16="http://schemas.microsoft.com/office/drawing/2014/main" id="{BF332C27-F3D2-1A09-B0D7-474F70365318}"/>
+          <p:cNvPr id="8" name="Picture 7">
+            <a:extLst>
+              <a:ext uri="{FF2B5EF4-FFF2-40B4-BE49-F238E27FC236}">
+                <a16:creationId xmlns:a16="http://schemas.microsoft.com/office/drawing/2014/main" id="{C3478036-427B-1AD8-104B-7988FBFE08C0}"/>
               </a:ext>
             </a:extLst>
           </p:cNvPr>
@@ -4154,197 +4709,20 @@
         </p:blipFill>
         <p:spPr>
           <a:xfrm>
-            <a:off x="1471262" y="2505075"/>
-            <a:ext cx="2960977" cy="4230953"/>
+            <a:off x="4162277" y="2415078"/>
+            <a:ext cx="4400550" cy="3733800"/>
           </a:xfrm>
           <a:prstGeom prst="rect">
             <a:avLst/>
           </a:prstGeom>
         </p:spPr>
       </p:pic>
-      <p:sp>
-        <p:nvSpPr>
-          <p:cNvPr id="2" name="Title 1">
-            <a:extLst>
-              <a:ext uri="{FF2B5EF4-FFF2-40B4-BE49-F238E27FC236}">
-                <a16:creationId xmlns:a16="http://schemas.microsoft.com/office/drawing/2014/main" id="{76C1940F-79ED-B497-B95F-606E8FBBBFA2}"/>
-              </a:ext>
-            </a:extLst>
-          </p:cNvPr>
-          <p:cNvSpPr>
-            <a:spLocks noGrp="1"/>
-          </p:cNvSpPr>
-          <p:nvPr>
-            <p:ph type="title"/>
-          </p:nvPr>
-        </p:nvSpPr>
-        <p:spPr/>
-        <p:txBody>
-          <a:bodyPr/>
-          <a:lstStyle/>
-          <a:p>
-            <a:r>
-              <a:rPr lang="en-GB" dirty="0"/>
-              <a:t>Inputs from GIR tool</a:t>
-            </a:r>
-          </a:p>
-        </p:txBody>
-      </p:sp>
-      <p:sp>
-        <p:nvSpPr>
-          <p:cNvPr id="9" name="Text Placeholder 8">
-            <a:extLst>
-              <a:ext uri="{FF2B5EF4-FFF2-40B4-BE49-F238E27FC236}">
-                <a16:creationId xmlns:a16="http://schemas.microsoft.com/office/drawing/2014/main" id="{A0092A09-7D75-21AB-3FF5-FE54E0937CBE}"/>
-              </a:ext>
-            </a:extLst>
-          </p:cNvPr>
-          <p:cNvSpPr>
-            <a:spLocks noGrp="1"/>
-          </p:cNvSpPr>
-          <p:nvPr>
-            <p:ph type="body" idx="1"/>
-          </p:nvPr>
-        </p:nvSpPr>
-        <p:spPr/>
-        <p:txBody>
-          <a:bodyPr>
-            <a:normAutofit/>
-          </a:bodyPr>
-          <a:lstStyle/>
-          <a:p>
-            <a:r>
-              <a:rPr lang="en-GB" dirty="0"/>
-              <a:t>Master CPT output file containing all locations</a:t>
-            </a:r>
-          </a:p>
-        </p:txBody>
-      </p:sp>
-      <p:sp>
-        <p:nvSpPr>
-          <p:cNvPr id="10" name="Text Placeholder 9">
-            <a:extLst>
-              <a:ext uri="{FF2B5EF4-FFF2-40B4-BE49-F238E27FC236}">
-                <a16:creationId xmlns:a16="http://schemas.microsoft.com/office/drawing/2014/main" id="{5FC15478-5B58-8FD1-F12E-1ABA4F3739E7}"/>
-              </a:ext>
-            </a:extLst>
-          </p:cNvPr>
-          <p:cNvSpPr>
-            <a:spLocks noGrp="1"/>
-          </p:cNvSpPr>
-          <p:nvPr>
-            <p:ph type="body" sz="quarter" idx="3"/>
-          </p:nvPr>
-        </p:nvSpPr>
-        <p:spPr>
-          <a:xfrm>
-            <a:off x="6172199" y="1681163"/>
-            <a:ext cx="5287529" cy="823912"/>
-          </a:xfrm>
-        </p:spPr>
-        <p:txBody>
-          <a:bodyPr>
-            <a:normAutofit/>
-          </a:bodyPr>
-          <a:lstStyle/>
-          <a:p>
-            <a:r>
-              <a:rPr lang="en-GB" dirty="0"/>
-              <a:t>Lab data per units (saved in a folder)</a:t>
-            </a:r>
-          </a:p>
-          <a:p>
-            <a:endParaRPr lang="en-GB" dirty="0"/>
-          </a:p>
-        </p:txBody>
-      </p:sp>
-      <p:sp>
-        <p:nvSpPr>
-          <p:cNvPr id="11" name="Content Placeholder 10">
-            <a:extLst>
-              <a:ext uri="{FF2B5EF4-FFF2-40B4-BE49-F238E27FC236}">
-                <a16:creationId xmlns:a16="http://schemas.microsoft.com/office/drawing/2014/main" id="{C472603A-087E-1F81-5EE6-0442E8FCF419}"/>
-              </a:ext>
-            </a:extLst>
-          </p:cNvPr>
-          <p:cNvSpPr>
-            <a:spLocks noGrp="1"/>
-          </p:cNvSpPr>
-          <p:nvPr>
-            <p:ph sz="quarter" idx="4"/>
-          </p:nvPr>
-        </p:nvSpPr>
-        <p:spPr/>
-        <p:txBody>
-          <a:bodyPr/>
-          <a:lstStyle/>
-          <a:p>
-            <a:endParaRPr lang="en-GB"/>
-          </a:p>
-        </p:txBody>
-      </p:sp>
-      <p:sp>
-        <p:nvSpPr>
-          <p:cNvPr id="6" name="Rectangle 5">
-            <a:extLst>
-              <a:ext uri="{FF2B5EF4-FFF2-40B4-BE49-F238E27FC236}">
-                <a16:creationId xmlns:a16="http://schemas.microsoft.com/office/drawing/2014/main" id="{3EB52068-5885-F1DA-9781-CCC202318260}"/>
-              </a:ext>
-            </a:extLst>
-          </p:cNvPr>
-          <p:cNvSpPr/>
-          <p:nvPr/>
-        </p:nvSpPr>
-        <p:spPr>
-          <a:xfrm>
-            <a:off x="1559368" y="3142817"/>
-            <a:ext cx="2784764" cy="176645"/>
-          </a:xfrm>
-          <a:prstGeom prst="rect">
-            <a:avLst/>
-          </a:prstGeom>
-          <a:noFill/>
-          <a:ln>
-            <a:solidFill>
-              <a:srgbClr val="C00000"/>
-            </a:solidFill>
-          </a:ln>
-        </p:spPr>
-        <p:style>
-          <a:lnRef idx="2">
-            <a:schemeClr val="accent1">
-              <a:shade val="15000"/>
-            </a:schemeClr>
-          </a:lnRef>
-          <a:fillRef idx="1">
-            <a:schemeClr val="accent1"/>
-          </a:fillRef>
-          <a:effectRef idx="0">
-            <a:schemeClr val="accent1"/>
-          </a:effectRef>
-          <a:fontRef idx="minor">
-            <a:schemeClr val="lt1"/>
-          </a:fontRef>
-        </p:style>
-        <p:txBody>
-          <a:bodyPr rtlCol="0" anchor="ctr"/>
-          <a:lstStyle/>
-          <a:p>
-            <a:pPr algn="ctr"/>
-            <a:endParaRPr lang="en-GB">
-              <a:solidFill>
-                <a:srgbClr val="FF0000"/>
-              </a:solidFill>
-            </a:endParaRPr>
-          </a:p>
-        </p:txBody>
-      </p:sp>
       <p:pic>
         <p:nvPicPr>
-          <p:cNvPr id="8" name="Picture 7">
-            <a:extLst>
-              <a:ext uri="{FF2B5EF4-FFF2-40B4-BE49-F238E27FC236}">
-                <a16:creationId xmlns:a16="http://schemas.microsoft.com/office/drawing/2014/main" id="{C3478036-427B-1AD8-104B-7988FBFE08C0}"/>
+          <p:cNvPr id="4" name="Picture 3">
+            <a:extLst>
+              <a:ext uri="{FF2B5EF4-FFF2-40B4-BE49-F238E27FC236}">
+                <a16:creationId xmlns:a16="http://schemas.microsoft.com/office/drawing/2014/main" id="{45787035-9F4E-92DE-D35A-328E67273361}"/>
               </a:ext>
             </a:extLst>
           </p:cNvPr>
@@ -4361,8 +4739,329 @@
         </p:blipFill>
         <p:spPr>
           <a:xfrm>
-            <a:off x="6320188" y="2505075"/>
-            <a:ext cx="4400550" cy="3733800"/>
+            <a:off x="247964" y="2505075"/>
+            <a:ext cx="3295650" cy="1038225"/>
+          </a:xfrm>
+          <a:prstGeom prst="rect">
+            <a:avLst/>
+          </a:prstGeom>
+        </p:spPr>
+      </p:pic>
+      <p:pic>
+        <p:nvPicPr>
+          <p:cNvPr id="12" name="Picture 11">
+            <a:extLst>
+              <a:ext uri="{FF2B5EF4-FFF2-40B4-BE49-F238E27FC236}">
+                <a16:creationId xmlns:a16="http://schemas.microsoft.com/office/drawing/2014/main" id="{7B3997FA-F9C2-588C-1597-9F47B3CEEF43}"/>
+              </a:ext>
+            </a:extLst>
+          </p:cNvPr>
+          <p:cNvPicPr>
+            <a:picLocks noChangeAspect="1"/>
+          </p:cNvPicPr>
+          <p:nvPr/>
+        </p:nvPicPr>
+        <p:blipFill>
+          <a:blip r:embed="rId4"/>
+          <a:stretch>
+            <a:fillRect/>
+          </a:stretch>
+        </p:blipFill>
+        <p:spPr>
+          <a:xfrm>
+            <a:off x="247964" y="3677544"/>
+            <a:ext cx="3562350" cy="323850"/>
+          </a:xfrm>
+          <a:prstGeom prst="rect">
+            <a:avLst/>
+          </a:prstGeom>
+        </p:spPr>
+      </p:pic>
+      <p:cxnSp>
+        <p:nvCxnSpPr>
+          <p:cNvPr id="14" name="Straight Connector 13">
+            <a:extLst>
+              <a:ext uri="{FF2B5EF4-FFF2-40B4-BE49-F238E27FC236}">
+                <a16:creationId xmlns:a16="http://schemas.microsoft.com/office/drawing/2014/main" id="{B177D26C-82F0-7A77-B29B-BAF7BEFAA41B}"/>
+              </a:ext>
+            </a:extLst>
+          </p:cNvPr>
+          <p:cNvCxnSpPr>
+            <a:cxnSpLocks/>
+          </p:cNvCxnSpPr>
+          <p:nvPr/>
+        </p:nvCxnSpPr>
+        <p:spPr>
+          <a:xfrm>
+            <a:off x="8932985" y="0"/>
+            <a:ext cx="57879" cy="6858000"/>
+          </a:xfrm>
+          <a:prstGeom prst="line">
+            <a:avLst/>
+          </a:prstGeom>
+          <a:ln w="76200"/>
+        </p:spPr>
+        <p:style>
+          <a:lnRef idx="2">
+            <a:schemeClr val="accent1"/>
+          </a:lnRef>
+          <a:fillRef idx="0">
+            <a:schemeClr val="accent1"/>
+          </a:fillRef>
+          <a:effectRef idx="1">
+            <a:schemeClr val="accent1"/>
+          </a:effectRef>
+          <a:fontRef idx="minor">
+            <a:schemeClr val="tx1"/>
+          </a:fontRef>
+        </p:style>
+      </p:cxnSp>
+      <p:sp>
+        <p:nvSpPr>
+          <p:cNvPr id="16" name="Text Placeholder 9">
+            <a:extLst>
+              <a:ext uri="{FF2B5EF4-FFF2-40B4-BE49-F238E27FC236}">
+                <a16:creationId xmlns:a16="http://schemas.microsoft.com/office/drawing/2014/main" id="{BB7B3B2B-6B81-C008-A8A4-E11F61DCF10D}"/>
+              </a:ext>
+            </a:extLst>
+          </p:cNvPr>
+          <p:cNvSpPr txBox="1">
+            <a:spLocks/>
+          </p:cNvSpPr>
+          <p:nvPr/>
+        </p:nvSpPr>
+        <p:spPr>
+          <a:xfrm>
+            <a:off x="9181490" y="1768292"/>
+            <a:ext cx="2971801" cy="823912"/>
+          </a:xfrm>
+          <a:prstGeom prst="rect">
+            <a:avLst/>
+          </a:prstGeom>
+        </p:spPr>
+        <p:txBody>
+          <a:bodyPr vert="horz" lIns="91440" tIns="45720" rIns="91440" bIns="45720" rtlCol="0" anchor="b">
+            <a:normAutofit fontScale="70000" lnSpcReduction="20000"/>
+          </a:bodyPr>
+          <a:lstStyle>
+            <a:lvl1pPr marL="0" indent="0" algn="l" defTabSz="914400" rtl="0" eaLnBrk="1" latinLnBrk="0" hangingPunct="1">
+              <a:lnSpc>
+                <a:spcPct val="90000"/>
+              </a:lnSpc>
+              <a:spcBef>
+                <a:spcPts val="1000"/>
+              </a:spcBef>
+              <a:buFont typeface="Arial" panose="020B0604020202020204" pitchFamily="34" charset="0"/>
+              <a:buNone/>
+              <a:defRPr sz="2400" b="1" kern="1200">
+                <a:solidFill>
+                  <a:schemeClr val="tx1"/>
+                </a:solidFill>
+                <a:latin typeface="+mn-lt"/>
+                <a:ea typeface="+mn-ea"/>
+                <a:cs typeface="+mn-cs"/>
+              </a:defRPr>
+            </a:lvl1pPr>
+            <a:lvl2pPr marL="457200" indent="0" algn="l" defTabSz="914400" rtl="0" eaLnBrk="1" latinLnBrk="0" hangingPunct="1">
+              <a:lnSpc>
+                <a:spcPct val="90000"/>
+              </a:lnSpc>
+              <a:spcBef>
+                <a:spcPts val="500"/>
+              </a:spcBef>
+              <a:buFont typeface="Arial" panose="020B0604020202020204" pitchFamily="34" charset="0"/>
+              <a:buNone/>
+              <a:defRPr sz="2000" b="1" kern="1200">
+                <a:solidFill>
+                  <a:schemeClr val="tx1"/>
+                </a:solidFill>
+                <a:latin typeface="+mn-lt"/>
+                <a:ea typeface="+mn-ea"/>
+                <a:cs typeface="+mn-cs"/>
+              </a:defRPr>
+            </a:lvl2pPr>
+            <a:lvl3pPr marL="914400" indent="0" algn="l" defTabSz="914400" rtl="0" eaLnBrk="1" latinLnBrk="0" hangingPunct="1">
+              <a:lnSpc>
+                <a:spcPct val="90000"/>
+              </a:lnSpc>
+              <a:spcBef>
+                <a:spcPts val="500"/>
+              </a:spcBef>
+              <a:buFont typeface="Arial" panose="020B0604020202020204" pitchFamily="34" charset="0"/>
+              <a:buNone/>
+              <a:defRPr sz="1800" b="1" kern="1200">
+                <a:solidFill>
+                  <a:schemeClr val="tx1"/>
+                </a:solidFill>
+                <a:latin typeface="+mn-lt"/>
+                <a:ea typeface="+mn-ea"/>
+                <a:cs typeface="+mn-cs"/>
+              </a:defRPr>
+            </a:lvl3pPr>
+            <a:lvl4pPr marL="1371600" indent="0" algn="l" defTabSz="914400" rtl="0" eaLnBrk="1" latinLnBrk="0" hangingPunct="1">
+              <a:lnSpc>
+                <a:spcPct val="90000"/>
+              </a:lnSpc>
+              <a:spcBef>
+                <a:spcPts val="500"/>
+              </a:spcBef>
+              <a:buFont typeface="Arial" panose="020B0604020202020204" pitchFamily="34" charset="0"/>
+              <a:buNone/>
+              <a:defRPr sz="1600" b="1" kern="1200">
+                <a:solidFill>
+                  <a:schemeClr val="tx1"/>
+                </a:solidFill>
+                <a:latin typeface="+mn-lt"/>
+                <a:ea typeface="+mn-ea"/>
+                <a:cs typeface="+mn-cs"/>
+              </a:defRPr>
+            </a:lvl4pPr>
+            <a:lvl5pPr marL="1828800" indent="0" algn="l" defTabSz="914400" rtl="0" eaLnBrk="1" latinLnBrk="0" hangingPunct="1">
+              <a:lnSpc>
+                <a:spcPct val="90000"/>
+              </a:lnSpc>
+              <a:spcBef>
+                <a:spcPts val="500"/>
+              </a:spcBef>
+              <a:buFont typeface="Arial" panose="020B0604020202020204" pitchFamily="34" charset="0"/>
+              <a:buNone/>
+              <a:defRPr sz="1600" b="1" kern="1200">
+                <a:solidFill>
+                  <a:schemeClr val="tx1"/>
+                </a:solidFill>
+                <a:latin typeface="+mn-lt"/>
+                <a:ea typeface="+mn-ea"/>
+                <a:cs typeface="+mn-cs"/>
+              </a:defRPr>
+            </a:lvl5pPr>
+            <a:lvl6pPr marL="2286000" indent="0" algn="l" defTabSz="914400" rtl="0" eaLnBrk="1" latinLnBrk="0" hangingPunct="1">
+              <a:lnSpc>
+                <a:spcPct val="90000"/>
+              </a:lnSpc>
+              <a:spcBef>
+                <a:spcPts val="500"/>
+              </a:spcBef>
+              <a:buFont typeface="Arial" panose="020B0604020202020204" pitchFamily="34" charset="0"/>
+              <a:buNone/>
+              <a:defRPr sz="1600" b="1" kern="1200">
+                <a:solidFill>
+                  <a:schemeClr val="tx1"/>
+                </a:solidFill>
+                <a:latin typeface="+mn-lt"/>
+                <a:ea typeface="+mn-ea"/>
+                <a:cs typeface="+mn-cs"/>
+              </a:defRPr>
+            </a:lvl6pPr>
+            <a:lvl7pPr marL="2743200" indent="0" algn="l" defTabSz="914400" rtl="0" eaLnBrk="1" latinLnBrk="0" hangingPunct="1">
+              <a:lnSpc>
+                <a:spcPct val="90000"/>
+              </a:lnSpc>
+              <a:spcBef>
+                <a:spcPts val="500"/>
+              </a:spcBef>
+              <a:buFont typeface="Arial" panose="020B0604020202020204" pitchFamily="34" charset="0"/>
+              <a:buNone/>
+              <a:defRPr sz="1600" b="1" kern="1200">
+                <a:solidFill>
+                  <a:schemeClr val="tx1"/>
+                </a:solidFill>
+                <a:latin typeface="+mn-lt"/>
+                <a:ea typeface="+mn-ea"/>
+                <a:cs typeface="+mn-cs"/>
+              </a:defRPr>
+            </a:lvl7pPr>
+            <a:lvl8pPr marL="3200400" indent="0" algn="l" defTabSz="914400" rtl="0" eaLnBrk="1" latinLnBrk="0" hangingPunct="1">
+              <a:lnSpc>
+                <a:spcPct val="90000"/>
+              </a:lnSpc>
+              <a:spcBef>
+                <a:spcPts val="500"/>
+              </a:spcBef>
+              <a:buFont typeface="Arial" panose="020B0604020202020204" pitchFamily="34" charset="0"/>
+              <a:buNone/>
+              <a:defRPr sz="1600" b="1" kern="1200">
+                <a:solidFill>
+                  <a:schemeClr val="tx1"/>
+                </a:solidFill>
+                <a:latin typeface="+mn-lt"/>
+                <a:ea typeface="+mn-ea"/>
+                <a:cs typeface="+mn-cs"/>
+              </a:defRPr>
+            </a:lvl8pPr>
+            <a:lvl9pPr marL="3657600" indent="0" algn="l" defTabSz="914400" rtl="0" eaLnBrk="1" latinLnBrk="0" hangingPunct="1">
+              <a:lnSpc>
+                <a:spcPct val="90000"/>
+              </a:lnSpc>
+              <a:spcBef>
+                <a:spcPts val="500"/>
+              </a:spcBef>
+              <a:buFont typeface="Arial" panose="020B0604020202020204" pitchFamily="34" charset="0"/>
+              <a:buNone/>
+              <a:defRPr sz="1600" b="1" kern="1200">
+                <a:solidFill>
+                  <a:schemeClr val="tx1"/>
+                </a:solidFill>
+                <a:latin typeface="+mn-lt"/>
+                <a:ea typeface="+mn-ea"/>
+                <a:cs typeface="+mn-cs"/>
+              </a:defRPr>
+            </a:lvl9pPr>
+          </a:lstStyle>
+          <a:p>
+            <a:r>
+              <a:rPr lang="en-GB" dirty="0">
+                <a:solidFill>
+                  <a:schemeClr val="accent5">
+                    <a:lumMod val="60000"/>
+                    <a:lumOff val="40000"/>
+                  </a:schemeClr>
+                </a:solidFill>
+              </a:rPr>
+              <a:t>CPT parameter comparison (saved in a folder)</a:t>
+            </a:r>
+          </a:p>
+          <a:p>
+            <a:r>
+              <a:rPr lang="en-GB" dirty="0">
+                <a:solidFill>
+                  <a:schemeClr val="accent5">
+                    <a:lumMod val="60000"/>
+                    <a:lumOff val="40000"/>
+                  </a:schemeClr>
+                </a:solidFill>
+              </a:rPr>
+              <a:t>OPTIONAL</a:t>
+            </a:r>
+          </a:p>
+          <a:p>
+            <a:endParaRPr lang="en-GB" dirty="0"/>
+          </a:p>
+        </p:txBody>
+      </p:sp>
+      <p:pic>
+        <p:nvPicPr>
+          <p:cNvPr id="18" name="Picture 17">
+            <a:extLst>
+              <a:ext uri="{FF2B5EF4-FFF2-40B4-BE49-F238E27FC236}">
+                <a16:creationId xmlns:a16="http://schemas.microsoft.com/office/drawing/2014/main" id="{CC871A03-4789-64EA-2A5D-DEB458AA0F94}"/>
+              </a:ext>
+            </a:extLst>
+          </p:cNvPr>
+          <p:cNvPicPr>
+            <a:picLocks noChangeAspect="1"/>
+          </p:cNvPicPr>
+          <p:nvPr/>
+        </p:nvPicPr>
+        <p:blipFill>
+          <a:blip r:embed="rId5"/>
+          <a:stretch>
+            <a:fillRect/>
+          </a:stretch>
+        </p:blipFill>
+        <p:spPr>
+          <a:xfrm>
+            <a:off x="9181490" y="2505075"/>
+            <a:ext cx="3095987" cy="2840648"/>
           </a:xfrm>
           <a:prstGeom prst="rect">
             <a:avLst/>
@@ -4399,6 +5098,36 @@
           <a:chExt cx="0" cy="0"/>
         </a:xfrm>
       </p:grpSpPr>
+      <p:pic>
+        <p:nvPicPr>
+          <p:cNvPr id="4" name="Picture 3">
+            <a:extLst>
+              <a:ext uri="{FF2B5EF4-FFF2-40B4-BE49-F238E27FC236}">
+                <a16:creationId xmlns:a16="http://schemas.microsoft.com/office/drawing/2014/main" id="{647ADC8D-4434-EEFB-A024-E26532A6E99C}"/>
+              </a:ext>
+            </a:extLst>
+          </p:cNvPr>
+          <p:cNvPicPr>
+            <a:picLocks noChangeAspect="1"/>
+          </p:cNvPicPr>
+          <p:nvPr/>
+        </p:nvPicPr>
+        <p:blipFill>
+          <a:blip r:embed="rId2"/>
+          <a:stretch>
+            <a:fillRect/>
+          </a:stretch>
+        </p:blipFill>
+        <p:spPr>
+          <a:xfrm>
+            <a:off x="144864" y="2049898"/>
+            <a:ext cx="11982450" cy="3305175"/>
+          </a:xfrm>
+          <a:prstGeom prst="rect">
+            <a:avLst/>
+          </a:prstGeom>
+        </p:spPr>
+      </p:pic>
       <p:sp>
         <p:nvSpPr>
           <p:cNvPr id="2" name="Title 1">
@@ -4427,7 +5156,7 @@
           <a:p>
             <a:r>
               <a:rPr lang="en-GB" dirty="0"/>
-              <a:t>Main </a:t>
+              <a:t>Main - DL_input_file.xlsx </a:t>
             </a:r>
           </a:p>
         </p:txBody>
@@ -4446,7 +5175,7 @@
         </p:nvSpPr>
         <p:spPr>
           <a:xfrm>
-            <a:off x="10640290" y="2723617"/>
+            <a:off x="10852293" y="2562565"/>
             <a:ext cx="464127" cy="800100"/>
           </a:xfrm>
           <a:prstGeom prst="rightBrace">
@@ -4478,64 +5207,29 @@
       </p:sp>
       <p:sp>
         <p:nvSpPr>
-          <p:cNvPr id="9" name="TextBox 8">
-            <a:extLst>
-              <a:ext uri="{FF2B5EF4-FFF2-40B4-BE49-F238E27FC236}">
-                <a16:creationId xmlns:a16="http://schemas.microsoft.com/office/drawing/2014/main" id="{A7A436F5-1FF9-CC4C-CD4B-C47D02158688}"/>
-              </a:ext>
-            </a:extLst>
-          </p:cNvPr>
-          <p:cNvSpPr txBox="1"/>
-          <p:nvPr/>
+          <p:cNvPr id="11" name="Content Placeholder 10">
+            <a:extLst>
+              <a:ext uri="{FF2B5EF4-FFF2-40B4-BE49-F238E27FC236}">
+                <a16:creationId xmlns:a16="http://schemas.microsoft.com/office/drawing/2014/main" id="{5699EACD-D508-9C32-5E88-3937AB821ABE}"/>
+              </a:ext>
+            </a:extLst>
+          </p:cNvPr>
+          <p:cNvSpPr>
+            <a:spLocks noGrp="1"/>
+          </p:cNvSpPr>
+          <p:nvPr>
+            <p:ph idx="1"/>
+          </p:nvPr>
         </p:nvSpPr>
         <p:spPr>
           <a:xfrm>
-            <a:off x="11234057" y="2628900"/>
-            <a:ext cx="723481" cy="1477328"/>
-          </a:xfrm>
-          <a:prstGeom prst="rect">
-            <a:avLst/>
-          </a:prstGeom>
-          <a:noFill/>
-        </p:spPr>
-        <p:txBody>
-          <a:bodyPr wrap="square" rtlCol="0">
-            <a:spAutoFit/>
-          </a:bodyPr>
-          <a:lstStyle/>
-          <a:p>
-            <a:r>
-              <a:rPr lang="en-GB" dirty="0"/>
-              <a:t>Outputs from GIR tool</a:t>
-            </a:r>
-          </a:p>
-        </p:txBody>
-      </p:sp>
-      <p:sp>
-        <p:nvSpPr>
-          <p:cNvPr id="11" name="Content Placeholder 10">
-            <a:extLst>
-              <a:ext uri="{FF2B5EF4-FFF2-40B4-BE49-F238E27FC236}">
-                <a16:creationId xmlns:a16="http://schemas.microsoft.com/office/drawing/2014/main" id="{5699EACD-D508-9C32-5E88-3937AB821ABE}"/>
-              </a:ext>
-            </a:extLst>
-          </p:cNvPr>
-          <p:cNvSpPr>
-            <a:spLocks noGrp="1"/>
-          </p:cNvSpPr>
-          <p:nvPr>
-            <p:ph idx="1"/>
-          </p:nvPr>
-        </p:nvSpPr>
-        <p:spPr>
-          <a:xfrm>
-            <a:off x="838200" y="5252437"/>
+            <a:off x="588817" y="5693051"/>
             <a:ext cx="10515600" cy="924525"/>
           </a:xfrm>
         </p:spPr>
         <p:txBody>
           <a:bodyPr>
-            <a:normAutofit/>
+            <a:normAutofit lnSpcReduction="10000"/>
           </a:bodyPr>
           <a:lstStyle/>
           <a:p>
@@ -4552,38 +5246,54 @@
               <a:t> based on parameter (with changed chart names, as modification to charts can not be done in python)</a:t>
             </a:r>
           </a:p>
-        </p:txBody>
-      </p:sp>
-      <p:pic>
-        <p:nvPicPr>
-          <p:cNvPr id="13" name="Picture 12">
-            <a:extLst>
-              <a:ext uri="{FF2B5EF4-FFF2-40B4-BE49-F238E27FC236}">
-                <a16:creationId xmlns:a16="http://schemas.microsoft.com/office/drawing/2014/main" id="{1D6FAC04-8AAB-B637-4F58-DDA66D681952}"/>
-              </a:ext>
-            </a:extLst>
-          </p:cNvPr>
-          <p:cNvPicPr>
-            <a:picLocks noChangeAspect="1"/>
-          </p:cNvPicPr>
-          <p:nvPr/>
-        </p:nvPicPr>
-        <p:blipFill>
-          <a:blip r:embed="rId2"/>
-          <a:stretch>
-            <a:fillRect/>
-          </a:stretch>
-        </p:blipFill>
-        <p:spPr>
-          <a:xfrm>
-            <a:off x="152400" y="2033587"/>
-            <a:ext cx="12039600" cy="2790825"/>
-          </a:xfrm>
-          <a:prstGeom prst="rect">
-            <a:avLst/>
-          </a:prstGeom>
-        </p:spPr>
-      </p:pic>
+          <a:p>
+            <a:r>
+              <a:rPr lang="en-GB" sz="1800" dirty="0" err="1">
+                <a:solidFill>
+                  <a:schemeClr val="accent5">
+                    <a:lumMod val="60000"/>
+                    <a:lumOff val="40000"/>
+                  </a:schemeClr>
+                </a:solidFill>
+              </a:rPr>
+              <a:t>CPT_method</a:t>
+            </a:r>
+            <a:r>
+              <a:rPr lang="en-GB" sz="1800" dirty="0">
+                <a:solidFill>
+                  <a:schemeClr val="accent5">
+                    <a:lumMod val="60000"/>
+                    <a:lumOff val="40000"/>
+                  </a:schemeClr>
+                </a:solidFill>
+              </a:rPr>
+              <a:t> compare is optional, if only different </a:t>
+            </a:r>
+            <a:r>
+              <a:rPr lang="en-GB" sz="1800" dirty="0" err="1">
+                <a:solidFill>
+                  <a:schemeClr val="accent5">
+                    <a:lumMod val="60000"/>
+                    <a:lumOff val="40000"/>
+                  </a:schemeClr>
+                </a:solidFill>
+              </a:rPr>
+              <a:t>cpt</a:t>
+            </a:r>
+            <a:r>
+              <a:rPr lang="en-GB" sz="1800" dirty="0">
+                <a:solidFill>
+                  <a:schemeClr val="accent5">
+                    <a:lumMod val="60000"/>
+                    <a:lumOff val="40000"/>
+                  </a:schemeClr>
+                </a:solidFill>
+              </a:rPr>
+              <a:t> correlations are plotted together</a:t>
+            </a:r>
+          </a:p>
+        </p:txBody>
+      </p:sp>
       <p:sp>
         <p:nvSpPr>
           <p:cNvPr id="6" name="Rectangle 5">
@@ -4746,8 +5456,8 @@
         </p:nvCxnSpPr>
         <p:spPr>
           <a:xfrm>
-            <a:off x="10262755" y="2628900"/>
-            <a:ext cx="841662" cy="432122"/>
+            <a:off x="10252212" y="2596491"/>
+            <a:ext cx="852205" cy="105039"/>
           </a:xfrm>
           <a:prstGeom prst="straightConnector1">
             <a:avLst/>
@@ -4788,7 +5498,7 @@
         </p:nvSpPr>
         <p:spPr>
           <a:xfrm>
-            <a:off x="11165394" y="2721233"/>
+            <a:off x="11239501" y="2661194"/>
             <a:ext cx="874206" cy="646331"/>
           </a:xfrm>
           <a:prstGeom prst="rect">
@@ -4857,43 +5567,48 @@
           </a:p>
         </p:txBody>
       </p:sp>
-      <p:sp>
-        <p:nvSpPr>
-          <p:cNvPr id="21" name="TextBox 20">
-            <a:extLst>
-              <a:ext uri="{FF2B5EF4-FFF2-40B4-BE49-F238E27FC236}">
-                <a16:creationId xmlns:a16="http://schemas.microsoft.com/office/drawing/2014/main" id="{B99D43F5-BF64-5F50-E738-ADC42BAFCDB7}"/>
-              </a:ext>
-            </a:extLst>
-          </p:cNvPr>
-          <p:cNvSpPr txBox="1"/>
+      <p:cxnSp>
+        <p:nvCxnSpPr>
+          <p:cNvPr id="12" name="Straight Arrow Connector 11">
+            <a:extLst>
+              <a:ext uri="{FF2B5EF4-FFF2-40B4-BE49-F238E27FC236}">
+                <a16:creationId xmlns:a16="http://schemas.microsoft.com/office/drawing/2014/main" id="{AAC85666-D8CA-444D-5A07-7B8FF2012395}"/>
+              </a:ext>
+            </a:extLst>
+          </p:cNvPr>
+          <p:cNvCxnSpPr/>
           <p:nvPr/>
-        </p:nvSpPr>
+        </p:nvCxnSpPr>
         <p:spPr>
-          <a:xfrm>
-            <a:off x="10004391" y="4553854"/>
-            <a:ext cx="2035210" cy="276999"/>
+          <a:xfrm flipV="1">
+            <a:off x="10678314" y="3331629"/>
+            <a:ext cx="827049" cy="1873417"/>
           </a:xfrm>
-          <a:prstGeom prst="rect">
+          <a:prstGeom prst="straightConnector1">
             <a:avLst/>
           </a:prstGeom>
-          <a:solidFill>
-            <a:srgbClr val="00B0F0"/>
-          </a:solidFill>
+          <a:ln>
+            <a:solidFill>
+              <a:srgbClr val="FF0000"/>
+            </a:solidFill>
+            <a:tailEnd type="triangle"/>
+          </a:ln>
         </p:spPr>
-        <p:txBody>
-          <a:bodyPr wrap="square" rtlCol="0">
-            <a:spAutoFit/>
-          </a:bodyPr>
-          <a:lstStyle/>
-          <a:p>
-            <a:r>
-              <a:rPr lang="en-GB" sz="1200" dirty="0"/>
-              <a:t>Empty if none</a:t>
-            </a:r>
-          </a:p>
-        </p:txBody>
-      </p:sp>
+        <p:style>
+          <a:lnRef idx="2">
+            <a:schemeClr val="accent1"/>
+          </a:lnRef>
+          <a:fillRef idx="0">
+            <a:schemeClr val="accent1"/>
+          </a:fillRef>
+          <a:effectRef idx="1">
+            <a:schemeClr val="accent1"/>
+          </a:effectRef>
+          <a:fontRef idx="minor">
+            <a:schemeClr val="tx1"/>
+          </a:fontRef>
+        </p:style>
+      </p:cxnSp>
     </p:spTree>
     <p:extLst>
       <p:ext uri="{BB962C8B-B14F-4D97-AF65-F5344CB8AC3E}">
@@ -4954,7 +5669,7 @@
           <a:p>
             <a:r>
               <a:rPr lang="en-GB" dirty="0"/>
-              <a:t>Plotting options</a:t>
+              <a:t>Plotting options - DL_input_file.xlsx</a:t>
             </a:r>
           </a:p>
         </p:txBody>
@@ -5107,7 +5822,7 @@
         <p:spPr>
           <a:xfrm>
             <a:off x="0" y="3644569"/>
-            <a:ext cx="4913645" cy="2308324"/>
+            <a:ext cx="4913645" cy="3416320"/>
           </a:xfrm>
           <a:prstGeom prst="rect">
             <a:avLst/>
@@ -5165,8 +5880,36 @@
           <a:p>
             <a:r>
               <a:rPr lang="en-GB" dirty="0"/>
-              <a:t>Don’t change cell names</a:t>
-            </a:r>
+              <a:t>(Don’t change cell names)</a:t>
+            </a:r>
+          </a:p>
+          <a:p>
+            <a:endParaRPr lang="en-GB" dirty="0"/>
+          </a:p>
+          <a:p>
+            <a:r>
+              <a:rPr lang="en-GB" dirty="0"/>
+              <a:t>Copy from copy sheet and paste in </a:t>
+            </a:r>
+            <a:r>
+              <a:rPr lang="en-GB" dirty="0" err="1"/>
+              <a:t>To_plot_CPT</a:t>
+            </a:r>
+            <a:r>
+              <a:rPr lang="en-GB" dirty="0"/>
+              <a:t> and </a:t>
+            </a:r>
+            <a:r>
+              <a:rPr lang="en-GB" dirty="0" err="1"/>
+              <a:t>To_plot_Lab</a:t>
+            </a:r>
+            <a:r>
+              <a:rPr lang="en-GB" dirty="0"/>
+              <a:t> sheets</a:t>
+            </a:r>
+          </a:p>
+          <a:p>
+            <a:endParaRPr lang="en-GB" dirty="0"/>
           </a:p>
           <a:p>
             <a:endParaRPr lang="en-GB" dirty="0"/>
@@ -5523,10 +6266,10 @@
       </p:grpSpPr>
       <p:sp>
         <p:nvSpPr>
-          <p:cNvPr id="7" name="Title 6">
-            <a:extLst>
-              <a:ext uri="{FF2B5EF4-FFF2-40B4-BE49-F238E27FC236}">
-                <a16:creationId xmlns:a16="http://schemas.microsoft.com/office/drawing/2014/main" id="{5670B685-8B05-AB6A-FA69-34FB89D3FF32}"/>
+          <p:cNvPr id="2" name="Title 1">
+            <a:extLst>
+              <a:ext uri="{FF2B5EF4-FFF2-40B4-BE49-F238E27FC236}">
+                <a16:creationId xmlns:a16="http://schemas.microsoft.com/office/drawing/2014/main" id="{F977AD8F-9A82-C846-78C7-49368ACDBAEC}"/>
               </a:ext>
             </a:extLst>
           </p:cNvPr>
@@ -5537,6 +6280,48 @@
             <p:ph type="title"/>
           </p:nvPr>
         </p:nvSpPr>
+        <p:spPr>
+          <a:xfrm>
+            <a:off x="496556" y="241828"/>
+            <a:ext cx="10515600" cy="927013"/>
+          </a:xfrm>
+        </p:spPr>
+        <p:txBody>
+          <a:bodyPr>
+            <a:normAutofit fontScale="90000"/>
+          </a:bodyPr>
+          <a:lstStyle/>
+          <a:p>
+            <a:r>
+              <a:rPr lang="en-GB" dirty="0">
+                <a:solidFill>
+                  <a:schemeClr val="accent5">
+                    <a:lumMod val="60000"/>
+                    <a:lumOff val="40000"/>
+                  </a:schemeClr>
+                </a:solidFill>
+              </a:rPr>
+              <a:t>Optional: CPT method comparison (per units or per location)</a:t>
+            </a:r>
+          </a:p>
+        </p:txBody>
+      </p:sp>
+      <p:sp>
+        <p:nvSpPr>
+          <p:cNvPr id="3" name="Content Placeholder 2">
+            <a:extLst>
+              <a:ext uri="{FF2B5EF4-FFF2-40B4-BE49-F238E27FC236}">
+                <a16:creationId xmlns:a16="http://schemas.microsoft.com/office/drawing/2014/main" id="{0B3B8652-3256-5DB8-1D5C-771273386D2C}"/>
+              </a:ext>
+            </a:extLst>
+          </p:cNvPr>
+          <p:cNvSpPr>
+            <a:spLocks noGrp="1"/>
+          </p:cNvSpPr>
+          <p:nvPr>
+            <p:ph idx="1"/>
+          </p:nvPr>
+        </p:nvSpPr>
         <p:spPr/>
         <p:txBody>
           <a:bodyPr/>
@@ -5544,49 +6329,616 @@
           <a:p>
             <a:r>
               <a:rPr lang="en-GB" dirty="0"/>
-              <a:t>Limitations</a:t>
-            </a:r>
-          </a:p>
-        </p:txBody>
-      </p:sp>
-      <p:sp>
-        <p:nvSpPr>
-          <p:cNvPr id="8" name="Content Placeholder 7">
-            <a:extLst>
-              <a:ext uri="{FF2B5EF4-FFF2-40B4-BE49-F238E27FC236}">
-                <a16:creationId xmlns:a16="http://schemas.microsoft.com/office/drawing/2014/main" id="{921367AE-6E1E-4086-625C-FB0CD3319BA8}"/>
-              </a:ext>
-            </a:extLst>
-          </p:cNvPr>
-          <p:cNvSpPr>
-            <a:spLocks noGrp="1"/>
-          </p:cNvSpPr>
-          <p:nvPr>
-            <p:ph idx="1"/>
-          </p:nvPr>
-        </p:nvSpPr>
-        <p:spPr/>
-        <p:txBody>
-          <a:bodyPr/>
-          <a:lstStyle/>
-          <a:p>
-            <a:r>
-              <a:rPr lang="en-GB" dirty="0"/>
-              <a:t>Currently separate excel sheets are prepared for each location/unit (Can not combine)</a:t>
-            </a:r>
-          </a:p>
-          <a:p>
-            <a:r>
-              <a:rPr lang="en-GB" dirty="0"/>
-              <a:t>Should be manually combined</a:t>
-            </a:r>
+              <a:t>GIR tool – set methods to ALL</a:t>
+            </a:r>
+          </a:p>
+          <a:p>
+            <a:pPr marL="0" indent="0">
+              <a:buNone/>
+            </a:pPr>
+            <a:endParaRPr lang="en-GB" dirty="0"/>
+          </a:p>
+          <a:p>
+            <a:pPr marL="0" indent="0">
+              <a:buNone/>
+            </a:pPr>
+            <a:endParaRPr lang="en-GB" dirty="0"/>
+          </a:p>
+        </p:txBody>
+      </p:sp>
+      <p:pic>
+        <p:nvPicPr>
+          <p:cNvPr id="5" name="Picture 4">
+            <a:extLst>
+              <a:ext uri="{FF2B5EF4-FFF2-40B4-BE49-F238E27FC236}">
+                <a16:creationId xmlns:a16="http://schemas.microsoft.com/office/drawing/2014/main" id="{FC4D6981-16C9-EF8A-0E9A-FE74B1846197}"/>
+              </a:ext>
+            </a:extLst>
+          </p:cNvPr>
+          <p:cNvPicPr>
+            <a:picLocks noChangeAspect="1"/>
+          </p:cNvPicPr>
+          <p:nvPr/>
+        </p:nvPicPr>
+        <p:blipFill>
+          <a:blip r:embed="rId2"/>
+          <a:stretch>
+            <a:fillRect/>
+          </a:stretch>
+        </p:blipFill>
+        <p:spPr>
+          <a:xfrm>
+            <a:off x="988139" y="3034080"/>
+            <a:ext cx="4086225" cy="1352550"/>
+          </a:xfrm>
+          <a:prstGeom prst="rect">
+            <a:avLst/>
+          </a:prstGeom>
+        </p:spPr>
+      </p:pic>
+      <p:pic>
+        <p:nvPicPr>
+          <p:cNvPr id="8" name="Picture 7">
+            <a:extLst>
+              <a:ext uri="{FF2B5EF4-FFF2-40B4-BE49-F238E27FC236}">
+                <a16:creationId xmlns:a16="http://schemas.microsoft.com/office/drawing/2014/main" id="{D9FD07E0-D248-8C35-6E6A-08F98EF4B87E}"/>
+              </a:ext>
+            </a:extLst>
+          </p:cNvPr>
+          <p:cNvPicPr>
+            <a:picLocks noChangeAspect="1"/>
+          </p:cNvPicPr>
+          <p:nvPr/>
+        </p:nvPicPr>
+        <p:blipFill>
+          <a:blip r:embed="rId3"/>
+          <a:stretch>
+            <a:fillRect/>
+          </a:stretch>
+        </p:blipFill>
+        <p:spPr>
+          <a:xfrm>
+            <a:off x="7874480" y="1640036"/>
+            <a:ext cx="3609975" cy="5124450"/>
+          </a:xfrm>
+          <a:prstGeom prst="rect">
+            <a:avLst/>
+          </a:prstGeom>
+        </p:spPr>
+      </p:pic>
+      <p:sp>
+        <p:nvSpPr>
+          <p:cNvPr id="9" name="Arrow: Right 8">
+            <a:extLst>
+              <a:ext uri="{FF2B5EF4-FFF2-40B4-BE49-F238E27FC236}">
+                <a16:creationId xmlns:a16="http://schemas.microsoft.com/office/drawing/2014/main" id="{63ACA11D-4E26-D7AE-7655-9659F70A8BEB}"/>
+              </a:ext>
+            </a:extLst>
+          </p:cNvPr>
+          <p:cNvSpPr/>
+          <p:nvPr/>
+        </p:nvSpPr>
+        <p:spPr>
+          <a:xfrm>
+            <a:off x="5335675" y="3587262"/>
+            <a:ext cx="2069960" cy="542611"/>
+          </a:xfrm>
+          <a:prstGeom prst="rightArrow">
+            <a:avLst/>
+          </a:prstGeom>
+        </p:spPr>
+        <p:style>
+          <a:lnRef idx="2">
+            <a:schemeClr val="accent1">
+              <a:shade val="15000"/>
+            </a:schemeClr>
+          </a:lnRef>
+          <a:fillRef idx="1">
+            <a:schemeClr val="accent1"/>
+          </a:fillRef>
+          <a:effectRef idx="0">
+            <a:schemeClr val="accent1"/>
+          </a:effectRef>
+          <a:fontRef idx="minor">
+            <a:schemeClr val="lt1"/>
+          </a:fontRef>
+        </p:style>
+        <p:txBody>
+          <a:bodyPr rtlCol="0" anchor="ctr"/>
+          <a:lstStyle/>
+          <a:p>
+            <a:pPr algn="ctr"/>
+            <a:endParaRPr lang="en-GB"/>
           </a:p>
         </p:txBody>
       </p:sp>
     </p:spTree>
     <p:extLst>
       <p:ext uri="{BB962C8B-B14F-4D97-AF65-F5344CB8AC3E}">
-        <p14:creationId xmlns:p14="http://schemas.microsoft.com/office/powerpoint/2010/main" val="1538239963"/>
+        <p14:creationId xmlns:p14="http://schemas.microsoft.com/office/powerpoint/2010/main" val="3758796533"/>
+      </p:ext>
+    </p:extLst>
+  </p:cSld>
+  <p:clrMapOvr>
+    <a:masterClrMapping/>
+  </p:clrMapOvr>
+</p:sld>
+</file>
+
+<file path=ppt/slides/slide8.xml><?xml version="1.0" encoding="utf-8"?>
+<p:sld xmlns:a="http://schemas.openxmlformats.org/drawingml/2006/main" xmlns:r="http://schemas.openxmlformats.org/officeDocument/2006/relationships" xmlns:p="http://schemas.openxmlformats.org/presentationml/2006/main">
+  <p:cSld>
+    <p:spTree>
+      <p:nvGrpSpPr>
+        <p:cNvPr id="1" name=""/>
+        <p:cNvGrpSpPr/>
+        <p:nvPr/>
+      </p:nvGrpSpPr>
+      <p:grpSpPr>
+        <a:xfrm>
+          <a:off x="0" y="0"/>
+          <a:ext cx="0" cy="0"/>
+          <a:chOff x="0" y="0"/>
+          <a:chExt cx="0" cy="0"/>
+        </a:xfrm>
+      </p:grpSpPr>
+      <p:pic>
+        <p:nvPicPr>
+          <p:cNvPr id="5" name="Content Placeholder 4">
+            <a:extLst>
+              <a:ext uri="{FF2B5EF4-FFF2-40B4-BE49-F238E27FC236}">
+                <a16:creationId xmlns:a16="http://schemas.microsoft.com/office/drawing/2014/main" id="{601BF7FA-54C2-C39B-DF5E-12E58AB85EA8}"/>
+              </a:ext>
+            </a:extLst>
+          </p:cNvPr>
+          <p:cNvPicPr>
+            <a:picLocks noGrp="1" noChangeAspect="1"/>
+          </p:cNvPicPr>
+          <p:nvPr>
+            <p:ph idx="1"/>
+          </p:nvPr>
+        </p:nvPicPr>
+        <p:blipFill>
+          <a:blip r:embed="rId2"/>
+          <a:stretch>
+            <a:fillRect/>
+          </a:stretch>
+        </p:blipFill>
+        <p:spPr>
+          <a:xfrm>
+            <a:off x="3736141" y="1584540"/>
+            <a:ext cx="3566670" cy="4351338"/>
+          </a:xfrm>
+          <a:prstGeom prst="rect">
+            <a:avLst/>
+          </a:prstGeom>
+        </p:spPr>
+      </p:pic>
+      <p:sp>
+        <p:nvSpPr>
+          <p:cNvPr id="8" name="Text Placeholder 4">
+            <a:extLst>
+              <a:ext uri="{FF2B5EF4-FFF2-40B4-BE49-F238E27FC236}">
+                <a16:creationId xmlns:a16="http://schemas.microsoft.com/office/drawing/2014/main" id="{3994FF61-BF87-0A28-F48D-7E37B9B4854E}"/>
+              </a:ext>
+            </a:extLst>
+          </p:cNvPr>
+          <p:cNvSpPr txBox="1">
+            <a:spLocks/>
+          </p:cNvSpPr>
+          <p:nvPr/>
+        </p:nvSpPr>
+        <p:spPr>
+          <a:xfrm>
+            <a:off x="3939444" y="1015985"/>
+            <a:ext cx="5157787" cy="823912"/>
+          </a:xfrm>
+          <a:prstGeom prst="rect">
+            <a:avLst/>
+          </a:prstGeom>
+        </p:spPr>
+        <p:txBody>
+          <a:bodyPr vert="horz" lIns="91440" tIns="45720" rIns="91440" bIns="45720" rtlCol="0">
+            <a:normAutofit/>
+          </a:bodyPr>
+          <a:lstStyle>
+            <a:lvl1pPr marL="228600" indent="-228600" algn="l" defTabSz="914400" rtl="0" eaLnBrk="1" latinLnBrk="0" hangingPunct="1">
+              <a:lnSpc>
+                <a:spcPct val="90000"/>
+              </a:lnSpc>
+              <a:spcBef>
+                <a:spcPts val="1000"/>
+              </a:spcBef>
+              <a:buFont typeface="Arial" panose="020B0604020202020204" pitchFamily="34" charset="0"/>
+              <a:buChar char="•"/>
+              <a:defRPr sz="2800" kern="1200">
+                <a:solidFill>
+                  <a:schemeClr val="tx1"/>
+                </a:solidFill>
+                <a:latin typeface="+mn-lt"/>
+                <a:ea typeface="+mn-ea"/>
+                <a:cs typeface="+mn-cs"/>
+              </a:defRPr>
+            </a:lvl1pPr>
+            <a:lvl2pPr marL="685800" indent="-228600" algn="l" defTabSz="914400" rtl="0" eaLnBrk="1" latinLnBrk="0" hangingPunct="1">
+              <a:lnSpc>
+                <a:spcPct val="90000"/>
+              </a:lnSpc>
+              <a:spcBef>
+                <a:spcPts val="500"/>
+              </a:spcBef>
+              <a:buFont typeface="Arial" panose="020B0604020202020204" pitchFamily="34" charset="0"/>
+              <a:buChar char="•"/>
+              <a:defRPr sz="2400" kern="1200">
+                <a:solidFill>
+                  <a:schemeClr val="tx1"/>
+                </a:solidFill>
+                <a:latin typeface="+mn-lt"/>
+                <a:ea typeface="+mn-ea"/>
+                <a:cs typeface="+mn-cs"/>
+              </a:defRPr>
+            </a:lvl2pPr>
+            <a:lvl3pPr marL="1143000" indent="-228600" algn="l" defTabSz="914400" rtl="0" eaLnBrk="1" latinLnBrk="0" hangingPunct="1">
+              <a:lnSpc>
+                <a:spcPct val="90000"/>
+              </a:lnSpc>
+              <a:spcBef>
+                <a:spcPts val="500"/>
+              </a:spcBef>
+              <a:buFont typeface="Arial" panose="020B0604020202020204" pitchFamily="34" charset="0"/>
+              <a:buChar char="•"/>
+              <a:defRPr sz="2000" kern="1200">
+                <a:solidFill>
+                  <a:schemeClr val="tx1"/>
+                </a:solidFill>
+                <a:latin typeface="+mn-lt"/>
+                <a:ea typeface="+mn-ea"/>
+                <a:cs typeface="+mn-cs"/>
+              </a:defRPr>
+            </a:lvl3pPr>
+            <a:lvl4pPr marL="1600200" indent="-228600" algn="l" defTabSz="914400" rtl="0" eaLnBrk="1" latinLnBrk="0" hangingPunct="1">
+              <a:lnSpc>
+                <a:spcPct val="90000"/>
+              </a:lnSpc>
+              <a:spcBef>
+                <a:spcPts val="500"/>
+              </a:spcBef>
+              <a:buFont typeface="Arial" panose="020B0604020202020204" pitchFamily="34" charset="0"/>
+              <a:buChar char="•"/>
+              <a:defRPr sz="1800" kern="1200">
+                <a:solidFill>
+                  <a:schemeClr val="tx1"/>
+                </a:solidFill>
+                <a:latin typeface="+mn-lt"/>
+                <a:ea typeface="+mn-ea"/>
+                <a:cs typeface="+mn-cs"/>
+              </a:defRPr>
+            </a:lvl4pPr>
+            <a:lvl5pPr marL="2057400" indent="-228600" algn="l" defTabSz="914400" rtl="0" eaLnBrk="1" latinLnBrk="0" hangingPunct="1">
+              <a:lnSpc>
+                <a:spcPct val="90000"/>
+              </a:lnSpc>
+              <a:spcBef>
+                <a:spcPts val="500"/>
+              </a:spcBef>
+              <a:buFont typeface="Arial" panose="020B0604020202020204" pitchFamily="34" charset="0"/>
+              <a:buChar char="•"/>
+              <a:defRPr sz="1800" kern="1200">
+                <a:solidFill>
+                  <a:schemeClr val="tx1"/>
+                </a:solidFill>
+                <a:latin typeface="+mn-lt"/>
+                <a:ea typeface="+mn-ea"/>
+                <a:cs typeface="+mn-cs"/>
+              </a:defRPr>
+            </a:lvl5pPr>
+            <a:lvl6pPr marL="2514600" indent="-228600" algn="l" defTabSz="914400" rtl="0" eaLnBrk="1" latinLnBrk="0" hangingPunct="1">
+              <a:lnSpc>
+                <a:spcPct val="90000"/>
+              </a:lnSpc>
+              <a:spcBef>
+                <a:spcPts val="500"/>
+              </a:spcBef>
+              <a:buFont typeface="Arial" panose="020B0604020202020204" pitchFamily="34" charset="0"/>
+              <a:buChar char="•"/>
+              <a:defRPr sz="1800" kern="1200">
+                <a:solidFill>
+                  <a:schemeClr val="tx1"/>
+                </a:solidFill>
+                <a:latin typeface="+mn-lt"/>
+                <a:ea typeface="+mn-ea"/>
+                <a:cs typeface="+mn-cs"/>
+              </a:defRPr>
+            </a:lvl6pPr>
+            <a:lvl7pPr marL="2971800" indent="-228600" algn="l" defTabSz="914400" rtl="0" eaLnBrk="1" latinLnBrk="0" hangingPunct="1">
+              <a:lnSpc>
+                <a:spcPct val="90000"/>
+              </a:lnSpc>
+              <a:spcBef>
+                <a:spcPts val="500"/>
+              </a:spcBef>
+              <a:buFont typeface="Arial" panose="020B0604020202020204" pitchFamily="34" charset="0"/>
+              <a:buChar char="•"/>
+              <a:defRPr sz="1800" kern="1200">
+                <a:solidFill>
+                  <a:schemeClr val="tx1"/>
+                </a:solidFill>
+                <a:latin typeface="+mn-lt"/>
+                <a:ea typeface="+mn-ea"/>
+                <a:cs typeface="+mn-cs"/>
+              </a:defRPr>
+            </a:lvl7pPr>
+            <a:lvl8pPr marL="3429000" indent="-228600" algn="l" defTabSz="914400" rtl="0" eaLnBrk="1" latinLnBrk="0" hangingPunct="1">
+              <a:lnSpc>
+                <a:spcPct val="90000"/>
+              </a:lnSpc>
+              <a:spcBef>
+                <a:spcPts val="500"/>
+              </a:spcBef>
+              <a:buFont typeface="Arial" panose="020B0604020202020204" pitchFamily="34" charset="0"/>
+              <a:buChar char="•"/>
+              <a:defRPr sz="1800" kern="1200">
+                <a:solidFill>
+                  <a:schemeClr val="tx1"/>
+                </a:solidFill>
+                <a:latin typeface="+mn-lt"/>
+                <a:ea typeface="+mn-ea"/>
+                <a:cs typeface="+mn-cs"/>
+              </a:defRPr>
+            </a:lvl8pPr>
+            <a:lvl9pPr marL="3886200" indent="-228600" algn="l" defTabSz="914400" rtl="0" eaLnBrk="1" latinLnBrk="0" hangingPunct="1">
+              <a:lnSpc>
+                <a:spcPct val="90000"/>
+              </a:lnSpc>
+              <a:spcBef>
+                <a:spcPts val="500"/>
+              </a:spcBef>
+              <a:buFont typeface="Arial" panose="020B0604020202020204" pitchFamily="34" charset="0"/>
+              <a:buChar char="•"/>
+              <a:defRPr sz="1800" kern="1200">
+                <a:solidFill>
+                  <a:schemeClr val="tx1"/>
+                </a:solidFill>
+                <a:latin typeface="+mn-lt"/>
+                <a:ea typeface="+mn-ea"/>
+                <a:cs typeface="+mn-cs"/>
+              </a:defRPr>
+            </a:lvl9pPr>
+          </a:lstStyle>
+          <a:p>
+            <a:pPr marL="0" indent="0">
+              <a:buNone/>
+            </a:pPr>
+            <a:r>
+              <a:rPr lang="en-GB" dirty="0" err="1"/>
+              <a:t>To_plot_CPT</a:t>
+            </a:r>
+            <a:endParaRPr lang="en-GB" dirty="0"/>
+          </a:p>
+        </p:txBody>
+      </p:sp>
+      <p:sp>
+        <p:nvSpPr>
+          <p:cNvPr id="10" name="TextBox 9">
+            <a:extLst>
+              <a:ext uri="{FF2B5EF4-FFF2-40B4-BE49-F238E27FC236}">
+                <a16:creationId xmlns:a16="http://schemas.microsoft.com/office/drawing/2014/main" id="{B6772EA4-394C-F315-7C80-520E848321C0}"/>
+              </a:ext>
+            </a:extLst>
+          </p:cNvPr>
+          <p:cNvSpPr txBox="1"/>
+          <p:nvPr/>
+        </p:nvSpPr>
+        <p:spPr>
+          <a:xfrm>
+            <a:off x="447909" y="1581440"/>
+            <a:ext cx="3243105" cy="646331"/>
+          </a:xfrm>
+          <a:prstGeom prst="rect">
+            <a:avLst/>
+          </a:prstGeom>
+          <a:noFill/>
+        </p:spPr>
+        <p:txBody>
+          <a:bodyPr wrap="square">
+            <a:spAutoFit/>
+          </a:bodyPr>
+          <a:lstStyle/>
+          <a:p>
+            <a:r>
+              <a:rPr lang="en-GB" dirty="0"/>
+              <a:t>Copy from copy sheet and paste in </a:t>
+            </a:r>
+            <a:r>
+              <a:rPr lang="en-GB" dirty="0" err="1"/>
+              <a:t>To_plot_CPT</a:t>
+            </a:r>
+            <a:r>
+              <a:rPr lang="en-GB" dirty="0"/>
+              <a:t> sheet</a:t>
+            </a:r>
+          </a:p>
+        </p:txBody>
+      </p:sp>
+      <p:sp>
+        <p:nvSpPr>
+          <p:cNvPr id="11" name="Title 1">
+            <a:extLst>
+              <a:ext uri="{FF2B5EF4-FFF2-40B4-BE49-F238E27FC236}">
+                <a16:creationId xmlns:a16="http://schemas.microsoft.com/office/drawing/2014/main" id="{3E3DEAC2-DBEC-5DD4-59AE-E6F84E7DFDC1}"/>
+              </a:ext>
+            </a:extLst>
+          </p:cNvPr>
+          <p:cNvSpPr>
+            <a:spLocks noGrp="1"/>
+          </p:cNvSpPr>
+          <p:nvPr>
+            <p:ph type="title"/>
+          </p:nvPr>
+        </p:nvSpPr>
+        <p:spPr>
+          <a:xfrm>
+            <a:off x="586992" y="275791"/>
+            <a:ext cx="10515600" cy="740194"/>
+          </a:xfrm>
+        </p:spPr>
+        <p:txBody>
+          <a:bodyPr/>
+          <a:lstStyle/>
+          <a:p>
+            <a:r>
+              <a:rPr lang="en-GB" dirty="0">
+                <a:solidFill>
+                  <a:schemeClr val="accent5">
+                    <a:lumMod val="60000"/>
+                    <a:lumOff val="40000"/>
+                  </a:schemeClr>
+                </a:solidFill>
+              </a:rPr>
+              <a:t>Optional: CPT method comparison</a:t>
+            </a:r>
+          </a:p>
+        </p:txBody>
+      </p:sp>
+      <p:sp>
+        <p:nvSpPr>
+          <p:cNvPr id="12" name="TextBox 11">
+            <a:extLst>
+              <a:ext uri="{FF2B5EF4-FFF2-40B4-BE49-F238E27FC236}">
+                <a16:creationId xmlns:a16="http://schemas.microsoft.com/office/drawing/2014/main" id="{B17CF586-3EF8-42AA-C06B-BBECC6C782F8}"/>
+              </a:ext>
+            </a:extLst>
+          </p:cNvPr>
+          <p:cNvSpPr txBox="1"/>
+          <p:nvPr/>
+        </p:nvSpPr>
+        <p:spPr>
+          <a:xfrm>
+            <a:off x="402783" y="2476260"/>
+            <a:ext cx="3243105" cy="646331"/>
+          </a:xfrm>
+          <a:prstGeom prst="rect">
+            <a:avLst/>
+          </a:prstGeom>
+          <a:noFill/>
+        </p:spPr>
+        <p:txBody>
+          <a:bodyPr wrap="square">
+            <a:spAutoFit/>
+          </a:bodyPr>
+          <a:lstStyle/>
+          <a:p>
+            <a:r>
+              <a:rPr lang="en-GB" dirty="0"/>
+              <a:t>NO change in </a:t>
+            </a:r>
+            <a:r>
+              <a:rPr lang="en-GB" dirty="0" err="1"/>
+              <a:t>To_plot_LAB</a:t>
+            </a:r>
+            <a:r>
+              <a:rPr lang="en-GB" dirty="0"/>
+              <a:t> sheet</a:t>
+            </a:r>
+          </a:p>
+        </p:txBody>
+      </p:sp>
+    </p:spTree>
+    <p:extLst>
+      <p:ext uri="{BB962C8B-B14F-4D97-AF65-F5344CB8AC3E}">
+        <p14:creationId xmlns:p14="http://schemas.microsoft.com/office/powerpoint/2010/main" val="1595311118"/>
+      </p:ext>
+    </p:extLst>
+  </p:cSld>
+  <p:clrMapOvr>
+    <a:masterClrMapping/>
+  </p:clrMapOvr>
+</p:sld>
+</file>
+
+<file path=ppt/slides/slide9.xml><?xml version="1.0" encoding="utf-8"?>
+<p:sld xmlns:a="http://schemas.openxmlformats.org/drawingml/2006/main" xmlns:r="http://schemas.openxmlformats.org/officeDocument/2006/relationships" xmlns:p="http://schemas.openxmlformats.org/presentationml/2006/main">
+  <p:cSld>
+    <p:spTree>
+      <p:nvGrpSpPr>
+        <p:cNvPr id="1" name=""/>
+        <p:cNvGrpSpPr/>
+        <p:nvPr/>
+      </p:nvGrpSpPr>
+      <p:grpSpPr>
+        <a:xfrm>
+          <a:off x="0" y="0"/>
+          <a:ext cx="0" cy="0"/>
+          <a:chOff x="0" y="0"/>
+          <a:chExt cx="0" cy="0"/>
+        </a:xfrm>
+      </p:grpSpPr>
+      <p:sp>
+        <p:nvSpPr>
+          <p:cNvPr id="7" name="Title 6">
+            <a:extLst>
+              <a:ext uri="{FF2B5EF4-FFF2-40B4-BE49-F238E27FC236}">
+                <a16:creationId xmlns:a16="http://schemas.microsoft.com/office/drawing/2014/main" id="{5670B685-8B05-AB6A-FA69-34FB89D3FF32}"/>
+              </a:ext>
+            </a:extLst>
+          </p:cNvPr>
+          <p:cNvSpPr>
+            <a:spLocks noGrp="1"/>
+          </p:cNvSpPr>
+          <p:nvPr>
+            <p:ph type="title"/>
+          </p:nvPr>
+        </p:nvSpPr>
+        <p:spPr/>
+        <p:txBody>
+          <a:bodyPr/>
+          <a:lstStyle/>
+          <a:p>
+            <a:r>
+              <a:rPr lang="en-GB" dirty="0"/>
+              <a:t>Limitations</a:t>
+            </a:r>
+          </a:p>
+        </p:txBody>
+      </p:sp>
+      <p:sp>
+        <p:nvSpPr>
+          <p:cNvPr id="8" name="Content Placeholder 7">
+            <a:extLst>
+              <a:ext uri="{FF2B5EF4-FFF2-40B4-BE49-F238E27FC236}">
+                <a16:creationId xmlns:a16="http://schemas.microsoft.com/office/drawing/2014/main" id="{921367AE-6E1E-4086-625C-FB0CD3319BA8}"/>
+              </a:ext>
+            </a:extLst>
+          </p:cNvPr>
+          <p:cNvSpPr>
+            <a:spLocks noGrp="1"/>
+          </p:cNvSpPr>
+          <p:nvPr>
+            <p:ph idx="1"/>
+          </p:nvPr>
+        </p:nvSpPr>
+        <p:spPr/>
+        <p:txBody>
+          <a:bodyPr/>
+          <a:lstStyle/>
+          <a:p>
+            <a:r>
+              <a:rPr lang="en-GB" dirty="0"/>
+              <a:t>Currently separate excel sheets are prepared for each location/unit (Can not combine)</a:t>
+            </a:r>
+          </a:p>
+          <a:p>
+            <a:r>
+              <a:rPr lang="en-GB" dirty="0"/>
+              <a:t>Excel sheets should be manually combined</a:t>
+            </a:r>
+          </a:p>
+        </p:txBody>
+      </p:sp>
+    </p:spTree>
+    <p:extLst>
+      <p:ext uri="{BB962C8B-B14F-4D97-AF65-F5344CB8AC3E}">
+        <p14:creationId xmlns:p14="http://schemas.microsoft.com/office/powerpoint/2010/main" val="337356283"/>
       </p:ext>
     </p:extLst>
   </p:cSld>

</xml_diff>